<commit_message>
Assignment Subjective Question & Answer added, PPT added
</commit_message>
<xml_diff>
--- a/Lead_Scoring_Case_study.pptx
+++ b/Lead_Scoring_Case_study.pptx
@@ -3234,33 +3234,67 @@
           </a:bodyPr>
           <a:lstStyle/>
           <a:p>
-            <a:r>
-              <a:rPr lang="en-US" sz="1600" dirty="0"/>
+            <a:pPr>
+              <a:buFont typeface="Wingdings" panose="05000000000000000000" pitchFamily="2" charset="2"/>
+              <a:buChar char="Ø"/>
+            </a:pPr>
+            <a:r>
+              <a:rPr lang="en-US" sz="1200" dirty="0">
+                <a:latin typeface="Arial" panose="020B0604020202020204" pitchFamily="34" charset="0"/>
+                <a:cs typeface="Arial" panose="020B0604020202020204" pitchFamily="34" charset="0"/>
+              </a:rPr>
               <a:t>Most of the converted leads ratio are from the customers who "will revert after reading email", "Closed by </a:t>
             </a:r>
             <a:r>
-              <a:rPr lang="en-US" sz="1600" dirty="0" err="1"/>
+              <a:rPr lang="en-US" sz="1200" dirty="0" err="1">
+                <a:latin typeface="Arial" panose="020B0604020202020204" pitchFamily="34" charset="0"/>
+                <a:cs typeface="Arial" panose="020B0604020202020204" pitchFamily="34" charset="0"/>
+              </a:rPr>
               <a:t>Horizzon</a:t>
             </a:r>
             <a:r>
-              <a:rPr lang="en-US" sz="1600" dirty="0"/>
+              <a:rPr lang="en-US" sz="1200" dirty="0">
+                <a:latin typeface="Arial" panose="020B0604020202020204" pitchFamily="34" charset="0"/>
+                <a:cs typeface="Arial" panose="020B0604020202020204" pitchFamily="34" charset="0"/>
+              </a:rPr>
               <a:t>" and "No Response".</a:t>
             </a:r>
           </a:p>
           <a:p>
-            <a:r>
-              <a:rPr lang="en-US" sz="1600" dirty="0"/>
+            <a:pPr>
+              <a:buFont typeface="Wingdings" panose="05000000000000000000" pitchFamily="2" charset="2"/>
+              <a:buChar char="Ø"/>
+            </a:pPr>
+            <a:r>
+              <a:rPr lang="en-US" sz="1200" dirty="0">
+                <a:latin typeface="Arial" panose="020B0604020202020204" pitchFamily="34" charset="0"/>
+                <a:cs typeface="Arial" panose="020B0604020202020204" pitchFamily="34" charset="0"/>
+              </a:rPr>
               <a:t>Almost 1000 leads which are received from "Ringing“, the converted ratio is very less.</a:t>
             </a:r>
           </a:p>
           <a:p>
-            <a:r>
-              <a:rPr lang="en-US" sz="1600" dirty="0"/>
+            <a:pPr>
+              <a:buFont typeface="Wingdings" panose="05000000000000000000" pitchFamily="2" charset="2"/>
+              <a:buChar char="Ø"/>
+            </a:pPr>
+            <a:r>
+              <a:rPr lang="en-US" sz="1200" dirty="0">
+                <a:latin typeface="Arial" panose="020B0604020202020204" pitchFamily="34" charset="0"/>
+                <a:cs typeface="Arial" panose="020B0604020202020204" pitchFamily="34" charset="0"/>
+              </a:rPr>
               <a:t>~200 leads are converted which are from “Lost to EINS”</a:t>
             </a:r>
           </a:p>
           <a:p>
-            <a:endParaRPr lang="en-US" sz="1600" dirty="0"/>
+            <a:pPr>
+              <a:buFont typeface="Wingdings" panose="05000000000000000000" pitchFamily="2" charset="2"/>
+              <a:buChar char="Ø"/>
+            </a:pPr>
+            <a:endParaRPr lang="en-US" sz="1200" dirty="0">
+              <a:latin typeface="Arial" panose="020B0604020202020204" pitchFamily="34" charset="0"/>
+              <a:cs typeface="Arial" panose="020B0604020202020204" pitchFamily="34" charset="0"/>
+            </a:endParaRPr>
           </a:p>
         </p:txBody>
       </p:sp>
@@ -3414,42 +3448,82 @@
           </a:bodyPr>
           <a:lstStyle/>
           <a:p>
-            <a:r>
-              <a:rPr lang="en-US" sz="1600" dirty="0"/>
+            <a:pPr>
+              <a:buFont typeface="Wingdings" panose="05000000000000000000" pitchFamily="2" charset="2"/>
+              <a:buChar char="Ø"/>
+            </a:pPr>
+            <a:r>
+              <a:rPr lang="en-US" sz="1200" dirty="0">
+                <a:latin typeface="Arial" panose="020B0604020202020204" pitchFamily="34" charset="0"/>
+                <a:cs typeface="Arial" panose="020B0604020202020204" pitchFamily="34" charset="0"/>
+              </a:rPr>
               <a:t>There are no strong correlations between the numerical columns.</a:t>
             </a:r>
           </a:p>
           <a:p>
-            <a:r>
-              <a:rPr lang="en-US" sz="1600" dirty="0"/>
+            <a:pPr>
+              <a:buFont typeface="Wingdings" panose="05000000000000000000" pitchFamily="2" charset="2"/>
+              <a:buChar char="Ø"/>
+            </a:pPr>
+            <a:r>
+              <a:rPr lang="en-US" sz="1200" dirty="0">
+                <a:latin typeface="Arial" panose="020B0604020202020204" pitchFamily="34" charset="0"/>
+                <a:cs typeface="Arial" panose="020B0604020202020204" pitchFamily="34" charset="0"/>
+              </a:rPr>
               <a:t>There is good correlation between "Total time spent on website" and "Converted“</a:t>
             </a:r>
           </a:p>
           <a:p>
-            <a:r>
-              <a:rPr lang="en-US" sz="1600" dirty="0"/>
+            <a:pPr>
+              <a:buFont typeface="Wingdings" panose="05000000000000000000" pitchFamily="2" charset="2"/>
+              <a:buChar char="Ø"/>
+            </a:pPr>
+            <a:r>
+              <a:rPr lang="en-US" sz="1200" dirty="0">
+                <a:latin typeface="Arial" panose="020B0604020202020204" pitchFamily="34" charset="0"/>
+                <a:cs typeface="Arial" panose="020B0604020202020204" pitchFamily="34" charset="0"/>
+              </a:rPr>
               <a:t>There is good correlation between "Page Views Per Visit" and "</a:t>
             </a:r>
             <a:r>
-              <a:rPr lang="en-US" sz="1600" dirty="0" err="1"/>
+              <a:rPr lang="en-US" sz="1200" dirty="0" err="1">
+                <a:latin typeface="Arial" panose="020B0604020202020204" pitchFamily="34" charset="0"/>
+                <a:cs typeface="Arial" panose="020B0604020202020204" pitchFamily="34" charset="0"/>
+              </a:rPr>
               <a:t>TotalVisits</a:t>
             </a:r>
             <a:r>
-              <a:rPr lang="en-US" sz="1600" dirty="0"/>
+              <a:rPr lang="en-US" sz="1200" dirty="0">
+                <a:latin typeface="Arial" panose="020B0604020202020204" pitchFamily="34" charset="0"/>
+                <a:cs typeface="Arial" panose="020B0604020202020204" pitchFamily="34" charset="0"/>
+              </a:rPr>
               <a:t>"</a:t>
             </a:r>
           </a:p>
           <a:p>
-            <a:r>
-              <a:rPr lang="en-US" sz="1600" dirty="0"/>
+            <a:pPr>
+              <a:buFont typeface="Wingdings" panose="05000000000000000000" pitchFamily="2" charset="2"/>
+              <a:buChar char="Ø"/>
+            </a:pPr>
+            <a:r>
+              <a:rPr lang="en-US" sz="1200" dirty="0">
+                <a:latin typeface="Arial" panose="020B0604020202020204" pitchFamily="34" charset="0"/>
+                <a:cs typeface="Arial" panose="020B0604020202020204" pitchFamily="34" charset="0"/>
+              </a:rPr>
               <a:t>Least correlation is between Converted and </a:t>
             </a:r>
             <a:r>
-              <a:rPr lang="en-US" sz="1600" dirty="0" err="1"/>
+              <a:rPr lang="en-US" sz="1200" dirty="0" err="1">
+                <a:latin typeface="Arial" panose="020B0604020202020204" pitchFamily="34" charset="0"/>
+                <a:cs typeface="Arial" panose="020B0604020202020204" pitchFamily="34" charset="0"/>
+              </a:rPr>
               <a:t>TotalVisits</a:t>
             </a:r>
             <a:r>
-              <a:rPr lang="en-US" sz="1600" dirty="0"/>
+              <a:rPr lang="en-US" sz="1200" dirty="0">
+                <a:latin typeface="Arial" panose="020B0604020202020204" pitchFamily="34" charset="0"/>
+                <a:cs typeface="Arial" panose="020B0604020202020204" pitchFamily="34" charset="0"/>
+              </a:rPr>
               <a:t>.</a:t>
             </a:r>
           </a:p>
@@ -3605,21 +3679,30 @@
           </a:bodyPr>
           <a:lstStyle/>
           <a:p>
-            <a:r>
-              <a:rPr lang="en-US" sz="1600" dirty="0"/>
+            <a:pPr marL="0" indent="0">
+              <a:buNone/>
+            </a:pPr>
+            <a:r>
+              <a:rPr lang="en-US" sz="1200" dirty="0">
+                <a:latin typeface="Arial" panose="020B0604020202020204" pitchFamily="34" charset="0"/>
+                <a:cs typeface="Arial" panose="020B0604020202020204" pitchFamily="34" charset="0"/>
+              </a:rPr>
               <a:t>The outliers in the “</a:t>
             </a:r>
             <a:r>
-              <a:rPr lang="en-US" sz="1600" dirty="0" err="1"/>
+              <a:rPr lang="en-US" sz="1200" dirty="0" err="1">
+                <a:latin typeface="Arial" panose="020B0604020202020204" pitchFamily="34" charset="0"/>
+                <a:cs typeface="Arial" panose="020B0604020202020204" pitchFamily="34" charset="0"/>
+              </a:rPr>
               <a:t>TotalVisits</a:t>
             </a:r>
             <a:r>
-              <a:rPr lang="en-US" sz="1600" dirty="0"/>
-              <a:t>”, “Page views per visit” and “Total Time spent on website” are removed. The datapoints which are above 99% and less than 1% are considered as outliers in these columns.</a:t>
-            </a:r>
-          </a:p>
-          <a:p>
-            <a:endParaRPr lang="en-US" sz="1600" dirty="0"/>
+              <a:rPr lang="en-US" sz="1200" dirty="0">
+                <a:latin typeface="Arial" panose="020B0604020202020204" pitchFamily="34" charset="0"/>
+                <a:cs typeface="Arial" panose="020B0604020202020204" pitchFamily="34" charset="0"/>
+              </a:rPr>
+              <a:t>”,  “Page views per visit” &amp; “Total Time spent on website” has been removed. The datapoints which are above 99% and less than 1% has been considered as an outliers in these columns.</a:t>
+            </a:r>
           </a:p>
         </p:txBody>
       </p:sp>
@@ -3769,100 +3852,211 @@
         </p:spPr>
         <p:txBody>
           <a:bodyPr>
-            <a:normAutofit fontScale="92500" lnSpcReduction="10000"/>
+            <a:normAutofit/>
           </a:bodyPr>
           <a:lstStyle/>
           <a:p>
-            <a:r>
-              <a:rPr lang="en-US" sz="1600" dirty="0"/>
+            <a:pPr>
+              <a:buFont typeface="Wingdings" panose="05000000000000000000" pitchFamily="2" charset="2"/>
+              <a:buChar char="Ø"/>
+            </a:pPr>
+            <a:r>
+              <a:rPr lang="en-US" sz="1200" dirty="0">
+                <a:latin typeface="Arial" panose="020B0604020202020204" pitchFamily="34" charset="0"/>
+                <a:cs typeface="Arial" panose="020B0604020202020204" pitchFamily="34" charset="0"/>
+              </a:rPr>
               <a:t>Splitting the dataset into train and test dataset</a:t>
             </a:r>
           </a:p>
           <a:p>
-            <a:r>
-              <a:rPr lang="en-US" sz="1600" dirty="0"/>
+            <a:pPr>
+              <a:buFont typeface="Wingdings" panose="05000000000000000000" pitchFamily="2" charset="2"/>
+              <a:buChar char="Ø"/>
+            </a:pPr>
+            <a:r>
+              <a:rPr lang="en-US" sz="1200" dirty="0">
+                <a:latin typeface="Arial" panose="020B0604020202020204" pitchFamily="34" charset="0"/>
+                <a:cs typeface="Arial" panose="020B0604020202020204" pitchFamily="34" charset="0"/>
+              </a:rPr>
               <a:t>Scaling numerical columns using </a:t>
             </a:r>
             <a:r>
-              <a:rPr lang="en-US" sz="1600" dirty="0" err="1"/>
+              <a:rPr lang="en-US" sz="1200" dirty="0" err="1">
+                <a:latin typeface="Arial" panose="020B0604020202020204" pitchFamily="34" charset="0"/>
+                <a:cs typeface="Arial" panose="020B0604020202020204" pitchFamily="34" charset="0"/>
+              </a:rPr>
               <a:t>StandardScaler</a:t>
             </a:r>
-            <a:endParaRPr lang="en-US" sz="1600" dirty="0"/>
-          </a:p>
-          <a:p>
-            <a:r>
-              <a:rPr lang="en-US" sz="1600" dirty="0"/>
+            <a:endParaRPr lang="en-US" sz="1200" dirty="0">
+              <a:latin typeface="Arial" panose="020B0604020202020204" pitchFamily="34" charset="0"/>
+              <a:cs typeface="Arial" panose="020B0604020202020204" pitchFamily="34" charset="0"/>
+            </a:endParaRPr>
+          </a:p>
+          <a:p>
+            <a:pPr>
+              <a:buFont typeface="Wingdings" panose="05000000000000000000" pitchFamily="2" charset="2"/>
+              <a:buChar char="Ø"/>
+            </a:pPr>
+            <a:r>
+              <a:rPr lang="en-US" sz="1200" dirty="0">
+                <a:latin typeface="Arial" panose="020B0604020202020204" pitchFamily="34" charset="0"/>
+                <a:cs typeface="Arial" panose="020B0604020202020204" pitchFamily="34" charset="0"/>
+              </a:rPr>
               <a:t>Model building using RFE to find most significant features and use Stats model for analysis</a:t>
             </a:r>
           </a:p>
           <a:p>
-            <a:r>
-              <a:rPr lang="en-US" sz="1600" dirty="0"/>
+            <a:pPr>
+              <a:buFont typeface="Wingdings" panose="05000000000000000000" pitchFamily="2" charset="2"/>
+              <a:buChar char="Ø"/>
+            </a:pPr>
+            <a:r>
+              <a:rPr lang="en-US" sz="1200" dirty="0">
+                <a:latin typeface="Arial" panose="020B0604020202020204" pitchFamily="34" charset="0"/>
+                <a:cs typeface="Arial" panose="020B0604020202020204" pitchFamily="34" charset="0"/>
+              </a:rPr>
               <a:t>Check VIF for the existing features</a:t>
             </a:r>
           </a:p>
           <a:p>
-            <a:r>
-              <a:rPr lang="en-US" sz="1600" dirty="0"/>
+            <a:pPr>
+              <a:buFont typeface="Wingdings" panose="05000000000000000000" pitchFamily="2" charset="2"/>
+              <a:buChar char="Ø"/>
+            </a:pPr>
+            <a:r>
+              <a:rPr lang="en-US" sz="1200" dirty="0">
+                <a:latin typeface="Arial" panose="020B0604020202020204" pitchFamily="34" charset="0"/>
+                <a:cs typeface="Arial" panose="020B0604020202020204" pitchFamily="34" charset="0"/>
+              </a:rPr>
               <a:t>Eliminate the variable with high p-value and high VIF value</a:t>
             </a:r>
           </a:p>
           <a:p>
-            <a:r>
-              <a:rPr lang="en-US" sz="1600" dirty="0"/>
+            <a:pPr>
+              <a:buFont typeface="Wingdings" panose="05000000000000000000" pitchFamily="2" charset="2"/>
+              <a:buChar char="Ø"/>
+            </a:pPr>
+            <a:r>
+              <a:rPr lang="en-US" sz="1200" dirty="0">
+                <a:latin typeface="Arial" panose="020B0604020202020204" pitchFamily="34" charset="0"/>
+                <a:cs typeface="Arial" panose="020B0604020202020204" pitchFamily="34" charset="0"/>
+              </a:rPr>
               <a:t>Rebuild the model after removing the variables which are not useful</a:t>
             </a:r>
           </a:p>
           <a:p>
-            <a:r>
-              <a:rPr lang="en-US" sz="1600" dirty="0"/>
+            <a:pPr>
+              <a:buFont typeface="Wingdings" panose="05000000000000000000" pitchFamily="2" charset="2"/>
+              <a:buChar char="Ø"/>
+            </a:pPr>
+            <a:r>
+              <a:rPr lang="en-US" sz="1200" dirty="0">
+                <a:latin typeface="Arial" panose="020B0604020202020204" pitchFamily="34" charset="0"/>
+                <a:cs typeface="Arial" panose="020B0604020202020204" pitchFamily="34" charset="0"/>
+              </a:rPr>
               <a:t>Predict the train dataset</a:t>
             </a:r>
           </a:p>
           <a:p>
-            <a:r>
-              <a:rPr lang="en-US" sz="1600" dirty="0"/>
+            <a:pPr>
+              <a:buFont typeface="Wingdings" panose="05000000000000000000" pitchFamily="2" charset="2"/>
+              <a:buChar char="Ø"/>
+            </a:pPr>
+            <a:r>
+              <a:rPr lang="en-US" sz="1200" dirty="0">
+                <a:latin typeface="Arial" panose="020B0604020202020204" pitchFamily="34" charset="0"/>
+                <a:cs typeface="Arial" panose="020B0604020202020204" pitchFamily="34" charset="0"/>
+              </a:rPr>
               <a:t>Calculate Accuracy, Specificity, Sensitivity using Confusion matrix</a:t>
             </a:r>
           </a:p>
           <a:p>
-            <a:r>
-              <a:rPr lang="en-US" sz="1600" dirty="0"/>
+            <a:pPr>
+              <a:buFont typeface="Wingdings" panose="05000000000000000000" pitchFamily="2" charset="2"/>
+              <a:buChar char="Ø"/>
+            </a:pPr>
+            <a:r>
+              <a:rPr lang="en-US" sz="1200" dirty="0">
+                <a:latin typeface="Arial" panose="020B0604020202020204" pitchFamily="34" charset="0"/>
+                <a:cs typeface="Arial" panose="020B0604020202020204" pitchFamily="34" charset="0"/>
+              </a:rPr>
               <a:t>Plot ROC curve</a:t>
             </a:r>
           </a:p>
           <a:p>
-            <a:r>
-              <a:rPr lang="en-US" sz="1600" dirty="0"/>
+            <a:pPr>
+              <a:buFont typeface="Wingdings" panose="05000000000000000000" pitchFamily="2" charset="2"/>
+              <a:buChar char="Ø"/>
+            </a:pPr>
+            <a:r>
+              <a:rPr lang="en-US" sz="1200" dirty="0">
+                <a:latin typeface="Arial" panose="020B0604020202020204" pitchFamily="34" charset="0"/>
+                <a:cs typeface="Arial" panose="020B0604020202020204" pitchFamily="34" charset="0"/>
+              </a:rPr>
               <a:t>Find the optimal cutoff point and adjust the probabilities if required</a:t>
             </a:r>
           </a:p>
           <a:p>
-            <a:r>
-              <a:rPr lang="en-US" sz="1600" dirty="0"/>
+            <a:pPr>
+              <a:buFont typeface="Wingdings" panose="05000000000000000000" pitchFamily="2" charset="2"/>
+              <a:buChar char="Ø"/>
+            </a:pPr>
+            <a:r>
+              <a:rPr lang="en-US" sz="1200" dirty="0">
+                <a:latin typeface="Arial" panose="020B0604020202020204" pitchFamily="34" charset="0"/>
+                <a:cs typeface="Arial" panose="020B0604020202020204" pitchFamily="34" charset="0"/>
+              </a:rPr>
               <a:t>Predict using test dataset and evaluate metrics - Accuracy, Specificity, Sensitivity</a:t>
             </a:r>
           </a:p>
           <a:p>
-            <a:r>
-              <a:rPr lang="en-US" sz="1600" dirty="0"/>
+            <a:pPr>
+              <a:buFont typeface="Wingdings" panose="05000000000000000000" pitchFamily="2" charset="2"/>
+              <a:buChar char="Ø"/>
+            </a:pPr>
+            <a:r>
+              <a:rPr lang="en-US" sz="1200" dirty="0">
+                <a:latin typeface="Arial" panose="020B0604020202020204" pitchFamily="34" charset="0"/>
+                <a:cs typeface="Arial" panose="020B0604020202020204" pitchFamily="34" charset="0"/>
+              </a:rPr>
               <a:t>Perform precision and recall tradeoff</a:t>
             </a:r>
           </a:p>
           <a:p>
-            <a:r>
-              <a:rPr lang="en-US" sz="1600" dirty="0"/>
+            <a:pPr>
+              <a:buFont typeface="Wingdings" panose="05000000000000000000" pitchFamily="2" charset="2"/>
+              <a:buChar char="Ø"/>
+            </a:pPr>
+            <a:r>
+              <a:rPr lang="en-US" sz="1200" dirty="0">
+                <a:latin typeface="Arial" panose="020B0604020202020204" pitchFamily="34" charset="0"/>
+                <a:cs typeface="Arial" panose="020B0604020202020204" pitchFamily="34" charset="0"/>
+              </a:rPr>
               <a:t>Calculate Accuracy, Specificity, Sensitivity using Confusion matrix</a:t>
             </a:r>
           </a:p>
           <a:p>
-            <a:r>
-              <a:rPr lang="en-US" sz="1600" dirty="0"/>
+            <a:pPr>
+              <a:buFont typeface="Wingdings" panose="05000000000000000000" pitchFamily="2" charset="2"/>
+              <a:buChar char="Ø"/>
+            </a:pPr>
+            <a:r>
+              <a:rPr lang="en-US" sz="1200" dirty="0">
+                <a:latin typeface="Arial" panose="020B0604020202020204" pitchFamily="34" charset="0"/>
+                <a:cs typeface="Arial" panose="020B0604020202020204" pitchFamily="34" charset="0"/>
+              </a:rPr>
               <a:t>Precision and Recall analysis on test dataset predictions.</a:t>
             </a:r>
           </a:p>
           <a:p>
-            <a:endParaRPr lang="en-US" sz="1600" dirty="0"/>
+            <a:pPr>
+              <a:buFont typeface="Wingdings" panose="05000000000000000000" pitchFamily="2" charset="2"/>
+              <a:buChar char="Ø"/>
+            </a:pPr>
+            <a:endParaRPr lang="en-US" sz="1200" dirty="0">
+              <a:latin typeface="Arial" panose="020B0604020202020204" pitchFamily="34" charset="0"/>
+              <a:cs typeface="Arial" panose="020B0604020202020204" pitchFamily="34" charset="0"/>
+            </a:endParaRPr>
           </a:p>
         </p:txBody>
       </p:sp>
@@ -4268,8 +4462,8 @@
         </p:blipFill>
         <p:spPr bwMode="auto">
           <a:xfrm>
-            <a:off x="1097281" y="3790593"/>
-            <a:ext cx="3585004" cy="2706776"/>
+            <a:off x="6371114" y="2133600"/>
+            <a:ext cx="4616029" cy="3485228"/>
           </a:xfrm>
           <a:prstGeom prst="rect">
             <a:avLst/>
@@ -4315,8 +4509,8 @@
         </p:blipFill>
         <p:spPr bwMode="auto">
           <a:xfrm>
-            <a:off x="1097280" y="1491241"/>
-            <a:ext cx="3585004" cy="2482553"/>
+            <a:off x="1011575" y="2133600"/>
+            <a:ext cx="5359539" cy="3711388"/>
           </a:xfrm>
           <a:prstGeom prst="rect">
             <a:avLst/>
@@ -4333,12 +4527,87 @@
           </a:extLst>
         </p:spPr>
       </p:pic>
+    </p:spTree>
+    <p:extLst>
+      <p:ext uri="{BB962C8B-B14F-4D97-AF65-F5344CB8AC3E}">
+        <p14:creationId xmlns:p14="http://schemas.microsoft.com/office/powerpoint/2010/main" val="2066811093"/>
+      </p:ext>
+    </p:extLst>
+  </p:cSld>
+  <p:clrMapOvr>
+    <a:masterClrMapping/>
+  </p:clrMapOvr>
+</p:sld>
+</file>
+
+<file path=ppt/slides/slide17.xml><?xml version="1.0" encoding="utf-8"?>
+<p:sld xmlns:a="http://schemas.openxmlformats.org/drawingml/2006/main" xmlns:r="http://schemas.openxmlformats.org/officeDocument/2006/relationships" xmlns:p="http://schemas.openxmlformats.org/presentationml/2006/main">
+  <p:cSld>
+    <p:spTree>
+      <p:nvGrpSpPr>
+        <p:cNvPr id="1" name="">
+          <a:extLst>
+            <a:ext uri="{FF2B5EF4-FFF2-40B4-BE49-F238E27FC236}">
+              <a16:creationId xmlns:a16="http://schemas.microsoft.com/office/drawing/2014/main" id="{E3CCBB50-A5A3-20A5-E199-9802BDE06134}"/>
+            </a:ext>
+          </a:extLst>
+        </p:cNvPr>
+        <p:cNvGrpSpPr/>
+        <p:nvPr/>
+      </p:nvGrpSpPr>
+      <p:grpSpPr>
+        <a:xfrm>
+          <a:off x="0" y="0"/>
+          <a:ext cx="0" cy="0"/>
+          <a:chOff x="0" y="0"/>
+          <a:chExt cx="0" cy="0"/>
+        </a:xfrm>
+      </p:grpSpPr>
+      <p:sp>
+        <p:nvSpPr>
+          <p:cNvPr id="2" name="Title 1">
+            <a:extLst>
+              <a:ext uri="{FF2B5EF4-FFF2-40B4-BE49-F238E27FC236}">
+                <a16:creationId xmlns:a16="http://schemas.microsoft.com/office/drawing/2014/main" id="{775E84A5-F435-53A3-EAAC-C4D1D67371DB}"/>
+              </a:ext>
+            </a:extLst>
+          </p:cNvPr>
+          <p:cNvSpPr>
+            <a:spLocks noGrp="1"/>
+          </p:cNvSpPr>
+          <p:nvPr>
+            <p:ph type="title"/>
+          </p:nvPr>
+        </p:nvSpPr>
+        <p:spPr>
+          <a:xfrm>
+            <a:off x="838200" y="608933"/>
+            <a:ext cx="10058400" cy="901262"/>
+          </a:xfrm>
+        </p:spPr>
+        <p:txBody>
+          <a:bodyPr>
+            <a:normAutofit/>
+          </a:bodyPr>
+          <a:lstStyle/>
+          <a:p>
+            <a:r>
+              <a:rPr lang="en-US" sz="3200" dirty="0">
+                <a:solidFill>
+                  <a:schemeClr val="accent2"/>
+                </a:solidFill>
+              </a:rPr>
+              <a:t>Model Evaluation (Test Dataset)</a:t>
+            </a:r>
+          </a:p>
+        </p:txBody>
+      </p:sp>
       <p:sp>
         <p:nvSpPr>
           <p:cNvPr id="7" name="Content Placeholder 2">
             <a:extLst>
               <a:ext uri="{FF2B5EF4-FFF2-40B4-BE49-F238E27FC236}">
-                <a16:creationId xmlns:a16="http://schemas.microsoft.com/office/drawing/2014/main" id="{73386C4D-22F5-7B6D-B54D-63F0B0A770F5}"/>
+                <a16:creationId xmlns:a16="http://schemas.microsoft.com/office/drawing/2014/main" id="{F9EA3E8B-3B7B-CF28-32A6-D20247136D88}"/>
               </a:ext>
             </a:extLst>
           </p:cNvPr>
@@ -4349,7 +4618,7 @@
         </p:nvSpPr>
         <p:spPr>
           <a:xfrm>
-            <a:off x="5298392" y="1307507"/>
+            <a:off x="1204956" y="1510195"/>
             <a:ext cx="4170347" cy="4982197"/>
           </a:xfrm>
           <a:prstGeom prst="rect">
@@ -4528,437 +4797,6 @@
             <a:pPr marL="0" indent="0">
               <a:buNone/>
             </a:pPr>
-            <a:endParaRPr lang="en-US" sz="1600" dirty="0">
-              <a:solidFill>
-                <a:schemeClr val="accent2"/>
-              </a:solidFill>
-            </a:endParaRPr>
-          </a:p>
-          <a:p>
-            <a:pPr marL="0" indent="0">
-              <a:buNone/>
-            </a:pPr>
-            <a:r>
-              <a:rPr lang="en-US" sz="1600" dirty="0">
-                <a:solidFill>
-                  <a:schemeClr val="accent2"/>
-                </a:solidFill>
-                <a:latin typeface="Helvetica Neue"/>
-              </a:rPr>
-              <a:t>Accuracy Sensitivity and Specificity</a:t>
-            </a:r>
-          </a:p>
-          <a:p>
-            <a:pPr marL="0" indent="0">
-              <a:buNone/>
-            </a:pPr>
-            <a:r>
-              <a:rPr lang="en-US" sz="1100" b="0" i="0" dirty="0">
-                <a:solidFill>
-                  <a:srgbClr val="000000"/>
-                </a:solidFill>
-                <a:effectLst/>
-                <a:latin typeface="Helvetica Neue"/>
-              </a:rPr>
-              <a:t>Accuracy:  92.41%</a:t>
-            </a:r>
-            <a:br>
-              <a:rPr lang="en-US" sz="1100" dirty="0"/>
-            </a:br>
-            <a:r>
-              <a:rPr lang="en-US" sz="1100" b="0" i="0" dirty="0">
-                <a:solidFill>
-                  <a:srgbClr val="000000"/>
-                </a:solidFill>
-                <a:effectLst/>
-                <a:latin typeface="Helvetica Neue"/>
-              </a:rPr>
-              <a:t>Sensitivity: 91.61%</a:t>
-            </a:r>
-            <a:br>
-              <a:rPr lang="en-US" sz="1100" dirty="0"/>
-            </a:br>
-            <a:r>
-              <a:rPr lang="en-US" sz="1100" b="0" i="0" dirty="0">
-                <a:solidFill>
-                  <a:srgbClr val="000000"/>
-                </a:solidFill>
-                <a:effectLst/>
-                <a:latin typeface="Helvetica Neue"/>
-              </a:rPr>
-              <a:t>Specificity: 92.53%</a:t>
-            </a:r>
-          </a:p>
-          <a:p>
-            <a:pPr marL="0" indent="0">
-              <a:buNone/>
-            </a:pPr>
-            <a:r>
-              <a:rPr lang="en-US" sz="1100" dirty="0">
-                <a:solidFill>
-                  <a:srgbClr val="000000"/>
-                </a:solidFill>
-                <a:latin typeface="Helvetica Neue"/>
-              </a:rPr>
-              <a:t>Confusion matrix : [ [ 2778,  224 ]</a:t>
-            </a:r>
-          </a:p>
-          <a:p>
-            <a:pPr marL="0" indent="0">
-              <a:buNone/>
-            </a:pPr>
-            <a:r>
-              <a:rPr lang="en-US" sz="1100" dirty="0">
-                <a:solidFill>
-                  <a:srgbClr val="000000"/>
-                </a:solidFill>
-                <a:latin typeface="Helvetica Neue"/>
-              </a:rPr>
-              <a:t>                                    162 , 1771  ] ]</a:t>
-            </a:r>
-            <a:endParaRPr lang="en-US" sz="1600" dirty="0"/>
-          </a:p>
-          <a:p>
-            <a:pPr marL="0" indent="0">
-              <a:buNone/>
-            </a:pPr>
-            <a:r>
-              <a:rPr lang="en-US" sz="1600" dirty="0"/>
-              <a:t>                                  </a:t>
-            </a:r>
-          </a:p>
-          <a:p>
-            <a:pPr marL="0" indent="0">
-              <a:buNone/>
-            </a:pPr>
-            <a:r>
-              <a:rPr lang="en-US" sz="1600" dirty="0">
-                <a:solidFill>
-                  <a:schemeClr val="accent2"/>
-                </a:solidFill>
-                <a:latin typeface="Helvetica Neue"/>
-              </a:rPr>
-              <a:t>Precision and Recall(After tradeoff)</a:t>
-            </a:r>
-            <a:endParaRPr lang="en-US" sz="1600" dirty="0">
-              <a:solidFill>
-                <a:schemeClr val="accent2"/>
-              </a:solidFill>
-            </a:endParaRPr>
-          </a:p>
-          <a:p>
-            <a:pPr marL="0" indent="0">
-              <a:buNone/>
-            </a:pPr>
-            <a:r>
-              <a:rPr lang="en-US" sz="1100" b="0" i="0" dirty="0">
-                <a:solidFill>
-                  <a:srgbClr val="000000"/>
-                </a:solidFill>
-                <a:effectLst/>
-                <a:latin typeface="Helvetica Neue"/>
-              </a:rPr>
-              <a:t>Precision: 90.72%</a:t>
-            </a:r>
-            <a:br>
-              <a:rPr lang="en-US" sz="1100" dirty="0"/>
-            </a:br>
-            <a:r>
-              <a:rPr lang="en-US" sz="1100" b="0" i="0" dirty="0">
-                <a:solidFill>
-                  <a:srgbClr val="000000"/>
-                </a:solidFill>
-                <a:effectLst/>
-                <a:latin typeface="Helvetica Neue"/>
-              </a:rPr>
-              <a:t>Recall:      90.11%</a:t>
-            </a:r>
-            <a:endParaRPr lang="en-US" sz="1600" dirty="0"/>
-          </a:p>
-          <a:p>
-            <a:pPr marL="0" indent="0">
-              <a:buNone/>
-            </a:pPr>
-            <a:endParaRPr lang="en-US" sz="1600" dirty="0"/>
-          </a:p>
-          <a:p>
-            <a:endParaRPr lang="en-US" sz="1600" dirty="0"/>
-          </a:p>
-          <a:p>
-            <a:endParaRPr lang="en-US" sz="1600" dirty="0"/>
-          </a:p>
-        </p:txBody>
-      </p:sp>
-    </p:spTree>
-    <p:extLst>
-      <p:ext uri="{BB962C8B-B14F-4D97-AF65-F5344CB8AC3E}">
-        <p14:creationId xmlns:p14="http://schemas.microsoft.com/office/powerpoint/2010/main" val="2066811093"/>
-      </p:ext>
-    </p:extLst>
-  </p:cSld>
-  <p:clrMapOvr>
-    <a:masterClrMapping/>
-  </p:clrMapOvr>
-</p:sld>
-</file>
-
-<file path=ppt/slides/slide17.xml><?xml version="1.0" encoding="utf-8"?>
-<p:sld xmlns:a="http://schemas.openxmlformats.org/drawingml/2006/main" xmlns:r="http://schemas.openxmlformats.org/officeDocument/2006/relationships" xmlns:p="http://schemas.openxmlformats.org/presentationml/2006/main">
-  <p:cSld>
-    <p:spTree>
-      <p:nvGrpSpPr>
-        <p:cNvPr id="1" name="">
-          <a:extLst>
-            <a:ext uri="{FF2B5EF4-FFF2-40B4-BE49-F238E27FC236}">
-              <a16:creationId xmlns:a16="http://schemas.microsoft.com/office/drawing/2014/main" id="{E3CCBB50-A5A3-20A5-E199-9802BDE06134}"/>
-            </a:ext>
-          </a:extLst>
-        </p:cNvPr>
-        <p:cNvGrpSpPr/>
-        <p:nvPr/>
-      </p:nvGrpSpPr>
-      <p:grpSpPr>
-        <a:xfrm>
-          <a:off x="0" y="0"/>
-          <a:ext cx="0" cy="0"/>
-          <a:chOff x="0" y="0"/>
-          <a:chExt cx="0" cy="0"/>
-        </a:xfrm>
-      </p:grpSpPr>
-      <p:sp>
-        <p:nvSpPr>
-          <p:cNvPr id="2" name="Title 1">
-            <a:extLst>
-              <a:ext uri="{FF2B5EF4-FFF2-40B4-BE49-F238E27FC236}">
-                <a16:creationId xmlns:a16="http://schemas.microsoft.com/office/drawing/2014/main" id="{775E84A5-F435-53A3-EAAC-C4D1D67371DB}"/>
-              </a:ext>
-            </a:extLst>
-          </p:cNvPr>
-          <p:cNvSpPr>
-            <a:spLocks noGrp="1"/>
-          </p:cNvSpPr>
-          <p:nvPr>
-            <p:ph type="title"/>
-          </p:nvPr>
-        </p:nvSpPr>
-        <p:spPr>
-          <a:xfrm>
-            <a:off x="838200" y="608933"/>
-            <a:ext cx="10058400" cy="901262"/>
-          </a:xfrm>
-        </p:spPr>
-        <p:txBody>
-          <a:bodyPr>
-            <a:normAutofit/>
-          </a:bodyPr>
-          <a:lstStyle/>
-          <a:p>
-            <a:r>
-              <a:rPr lang="en-US" sz="3200" dirty="0">
-                <a:solidFill>
-                  <a:schemeClr val="accent2"/>
-                </a:solidFill>
-              </a:rPr>
-              <a:t>Model Evaluation (Test Dataset)</a:t>
-            </a:r>
-          </a:p>
-        </p:txBody>
-      </p:sp>
-      <p:sp>
-        <p:nvSpPr>
-          <p:cNvPr id="7" name="Content Placeholder 2">
-            <a:extLst>
-              <a:ext uri="{FF2B5EF4-FFF2-40B4-BE49-F238E27FC236}">
-                <a16:creationId xmlns:a16="http://schemas.microsoft.com/office/drawing/2014/main" id="{F9EA3E8B-3B7B-CF28-32A6-D20247136D88}"/>
-              </a:ext>
-            </a:extLst>
-          </p:cNvPr>
-          <p:cNvSpPr txBox="1">
-            <a:spLocks/>
-          </p:cNvSpPr>
-          <p:nvPr/>
-        </p:nvSpPr>
-        <p:spPr>
-          <a:xfrm>
-            <a:off x="1204956" y="1510195"/>
-            <a:ext cx="4170347" cy="4982197"/>
-          </a:xfrm>
-          <a:prstGeom prst="rect">
-            <a:avLst/>
-          </a:prstGeom>
-        </p:spPr>
-        <p:txBody>
-          <a:bodyPr vert="horz" lIns="91440" tIns="45720" rIns="91440" bIns="45720" rtlCol="0">
-            <a:normAutofit/>
-          </a:bodyPr>
-          <a:lstStyle>
-            <a:lvl1pPr marL="228600" indent="-228600" algn="l" defTabSz="914400" rtl="0" eaLnBrk="1" latinLnBrk="0" hangingPunct="1">
-              <a:lnSpc>
-                <a:spcPct val="90000"/>
-              </a:lnSpc>
-              <a:spcBef>
-                <a:spcPts val="1000"/>
-              </a:spcBef>
-              <a:buFont typeface="Arial" panose="020B0604020202020204" pitchFamily="34" charset="0"/>
-              <a:buChar char="•"/>
-              <a:defRPr sz="2800" kern="1200">
-                <a:solidFill>
-                  <a:schemeClr val="tx1"/>
-                </a:solidFill>
-                <a:latin typeface="+mn-lt"/>
-                <a:ea typeface="+mn-ea"/>
-                <a:cs typeface="+mn-cs"/>
-              </a:defRPr>
-            </a:lvl1pPr>
-            <a:lvl2pPr marL="685800" indent="-228600" algn="l" defTabSz="914400" rtl="0" eaLnBrk="1" latinLnBrk="0" hangingPunct="1">
-              <a:lnSpc>
-                <a:spcPct val="90000"/>
-              </a:lnSpc>
-              <a:spcBef>
-                <a:spcPts val="500"/>
-              </a:spcBef>
-              <a:buFont typeface="Arial" panose="020B0604020202020204" pitchFamily="34" charset="0"/>
-              <a:buChar char="•"/>
-              <a:defRPr sz="2400" kern="1200">
-                <a:solidFill>
-                  <a:schemeClr val="tx1"/>
-                </a:solidFill>
-                <a:latin typeface="+mn-lt"/>
-                <a:ea typeface="+mn-ea"/>
-                <a:cs typeface="+mn-cs"/>
-              </a:defRPr>
-            </a:lvl2pPr>
-            <a:lvl3pPr marL="1143000" indent="-228600" algn="l" defTabSz="914400" rtl="0" eaLnBrk="1" latinLnBrk="0" hangingPunct="1">
-              <a:lnSpc>
-                <a:spcPct val="90000"/>
-              </a:lnSpc>
-              <a:spcBef>
-                <a:spcPts val="500"/>
-              </a:spcBef>
-              <a:buFont typeface="Arial" panose="020B0604020202020204" pitchFamily="34" charset="0"/>
-              <a:buChar char="•"/>
-              <a:defRPr sz="2000" kern="1200">
-                <a:solidFill>
-                  <a:schemeClr val="tx1"/>
-                </a:solidFill>
-                <a:latin typeface="+mn-lt"/>
-                <a:ea typeface="+mn-ea"/>
-                <a:cs typeface="+mn-cs"/>
-              </a:defRPr>
-            </a:lvl3pPr>
-            <a:lvl4pPr marL="1600200" indent="-228600" algn="l" defTabSz="914400" rtl="0" eaLnBrk="1" latinLnBrk="0" hangingPunct="1">
-              <a:lnSpc>
-                <a:spcPct val="90000"/>
-              </a:lnSpc>
-              <a:spcBef>
-                <a:spcPts val="500"/>
-              </a:spcBef>
-              <a:buFont typeface="Arial" panose="020B0604020202020204" pitchFamily="34" charset="0"/>
-              <a:buChar char="•"/>
-              <a:defRPr sz="1800" kern="1200">
-                <a:solidFill>
-                  <a:schemeClr val="tx1"/>
-                </a:solidFill>
-                <a:latin typeface="+mn-lt"/>
-                <a:ea typeface="+mn-ea"/>
-                <a:cs typeface="+mn-cs"/>
-              </a:defRPr>
-            </a:lvl4pPr>
-            <a:lvl5pPr marL="2057400" indent="-228600" algn="l" defTabSz="914400" rtl="0" eaLnBrk="1" latinLnBrk="0" hangingPunct="1">
-              <a:lnSpc>
-                <a:spcPct val="90000"/>
-              </a:lnSpc>
-              <a:spcBef>
-                <a:spcPts val="500"/>
-              </a:spcBef>
-              <a:buFont typeface="Arial" panose="020B0604020202020204" pitchFamily="34" charset="0"/>
-              <a:buChar char="•"/>
-              <a:defRPr sz="1800" kern="1200">
-                <a:solidFill>
-                  <a:schemeClr val="tx1"/>
-                </a:solidFill>
-                <a:latin typeface="+mn-lt"/>
-                <a:ea typeface="+mn-ea"/>
-                <a:cs typeface="+mn-cs"/>
-              </a:defRPr>
-            </a:lvl5pPr>
-            <a:lvl6pPr marL="2514600" indent="-228600" algn="l" defTabSz="914400" rtl="0" eaLnBrk="1" latinLnBrk="0" hangingPunct="1">
-              <a:lnSpc>
-                <a:spcPct val="90000"/>
-              </a:lnSpc>
-              <a:spcBef>
-                <a:spcPts val="500"/>
-              </a:spcBef>
-              <a:buFont typeface="Arial" panose="020B0604020202020204" pitchFamily="34" charset="0"/>
-              <a:buChar char="•"/>
-              <a:defRPr sz="1800" kern="1200">
-                <a:solidFill>
-                  <a:schemeClr val="tx1"/>
-                </a:solidFill>
-                <a:latin typeface="+mn-lt"/>
-                <a:ea typeface="+mn-ea"/>
-                <a:cs typeface="+mn-cs"/>
-              </a:defRPr>
-            </a:lvl6pPr>
-            <a:lvl7pPr marL="2971800" indent="-228600" algn="l" defTabSz="914400" rtl="0" eaLnBrk="1" latinLnBrk="0" hangingPunct="1">
-              <a:lnSpc>
-                <a:spcPct val="90000"/>
-              </a:lnSpc>
-              <a:spcBef>
-                <a:spcPts val="500"/>
-              </a:spcBef>
-              <a:buFont typeface="Arial" panose="020B0604020202020204" pitchFamily="34" charset="0"/>
-              <a:buChar char="•"/>
-              <a:defRPr sz="1800" kern="1200">
-                <a:solidFill>
-                  <a:schemeClr val="tx1"/>
-                </a:solidFill>
-                <a:latin typeface="+mn-lt"/>
-                <a:ea typeface="+mn-ea"/>
-                <a:cs typeface="+mn-cs"/>
-              </a:defRPr>
-            </a:lvl7pPr>
-            <a:lvl8pPr marL="3429000" indent="-228600" algn="l" defTabSz="914400" rtl="0" eaLnBrk="1" latinLnBrk="0" hangingPunct="1">
-              <a:lnSpc>
-                <a:spcPct val="90000"/>
-              </a:lnSpc>
-              <a:spcBef>
-                <a:spcPts val="500"/>
-              </a:spcBef>
-              <a:buFont typeface="Arial" panose="020B0604020202020204" pitchFamily="34" charset="0"/>
-              <a:buChar char="•"/>
-              <a:defRPr sz="1800" kern="1200">
-                <a:solidFill>
-                  <a:schemeClr val="tx1"/>
-                </a:solidFill>
-                <a:latin typeface="+mn-lt"/>
-                <a:ea typeface="+mn-ea"/>
-                <a:cs typeface="+mn-cs"/>
-              </a:defRPr>
-            </a:lvl8pPr>
-            <a:lvl9pPr marL="3886200" indent="-228600" algn="l" defTabSz="914400" rtl="0" eaLnBrk="1" latinLnBrk="0" hangingPunct="1">
-              <a:lnSpc>
-                <a:spcPct val="90000"/>
-              </a:lnSpc>
-              <a:spcBef>
-                <a:spcPts val="500"/>
-              </a:spcBef>
-              <a:buFont typeface="Arial" panose="020B0604020202020204" pitchFamily="34" charset="0"/>
-              <a:buChar char="•"/>
-              <a:defRPr sz="1800" kern="1200">
-                <a:solidFill>
-                  <a:schemeClr val="tx1"/>
-                </a:solidFill>
-                <a:latin typeface="+mn-lt"/>
-                <a:ea typeface="+mn-ea"/>
-                <a:cs typeface="+mn-cs"/>
-              </a:defRPr>
-            </a:lvl9pPr>
-          </a:lstStyle>
-          <a:p>
-            <a:pPr marL="0" indent="0">
-              <a:buNone/>
-            </a:pPr>
             <a:endParaRPr lang="en-US" sz="1600" dirty="0"/>
           </a:p>
           <a:p>
@@ -4996,7 +4834,7 @@
               <a:buNone/>
             </a:pPr>
             <a:r>
-              <a:rPr lang="en-US" sz="1700" dirty="0">
+              <a:rPr lang="en-US" sz="1800" b="1" dirty="0">
                 <a:solidFill>
                   <a:schemeClr val="accent2"/>
                 </a:solidFill>
@@ -5005,57 +4843,39 @@
             </a:r>
           </a:p>
           <a:p>
+            <a:pPr marL="457200" lvl="1" indent="0">
+              <a:buNone/>
+            </a:pPr>
+            <a:r>
+              <a:rPr lang="en-US" sz="1200" dirty="0"/>
+              <a:t>Accuracy: 91.11%</a:t>
+            </a:r>
+            <a:br>
+              <a:rPr lang="en-US" sz="1200" dirty="0"/>
+            </a:br>
+            <a:r>
+              <a:rPr lang="en-US" sz="1200" dirty="0"/>
+              <a:t>Sensitivity: 88.55%</a:t>
+            </a:r>
+            <a:br>
+              <a:rPr lang="en-US" sz="1200" dirty="0"/>
+            </a:br>
+            <a:r>
+              <a:rPr lang="en-US" sz="1200" dirty="0"/>
+              <a:t>Specificity: 92.67%</a:t>
+            </a:r>
+          </a:p>
+          <a:p>
             <a:pPr marL="0" indent="0">
               <a:buNone/>
             </a:pPr>
             <a:r>
-              <a:rPr lang="en-US" sz="1700" dirty="0"/>
-              <a:t>Accuracy: 91.11%</a:t>
-            </a:r>
-            <a:br>
-              <a:rPr lang="en-US" sz="1700" dirty="0"/>
-            </a:br>
-            <a:r>
-              <a:rPr lang="en-US" sz="1700" dirty="0"/>
-              <a:t>Sensitivity: 88.55%</a:t>
-            </a:r>
-            <a:br>
-              <a:rPr lang="en-US" sz="1700" dirty="0"/>
-            </a:br>
-            <a:r>
-              <a:rPr lang="en-US" sz="1700" dirty="0"/>
-              <a:t>Specificity: 92.67%</a:t>
-            </a:r>
-          </a:p>
-          <a:p>
-            <a:pPr marL="0" indent="0">
-              <a:buNone/>
-            </a:pPr>
-            <a:r>
-              <a:rPr lang="en-US" sz="1700" dirty="0"/>
-              <a:t>Confusion matrix : [ [ 1215,  96 ]</a:t>
-            </a:r>
-          </a:p>
-          <a:p>
-            <a:pPr marL="0" indent="0">
-              <a:buNone/>
-            </a:pPr>
-            <a:r>
-              <a:rPr lang="en-US" sz="1700" dirty="0"/>
-              <a:t>                                    92 , 712  ] ]</a:t>
-            </a:r>
-          </a:p>
-          <a:p>
-            <a:pPr marL="0" indent="0">
-              <a:buNone/>
-            </a:pPr>
-            <a:r>
-              <a:rPr lang="en-US" sz="1700" dirty="0">
+              <a:rPr lang="en-US" sz="1800" b="1" dirty="0">
                 <a:solidFill>
                   <a:schemeClr val="accent2"/>
                 </a:solidFill>
               </a:rPr>
-              <a:t>                    </a:t>
+              <a:t>Confusion matrix</a:t>
             </a:r>
           </a:p>
           <a:p>
@@ -5063,20 +4883,17 @@
               <a:buNone/>
             </a:pPr>
             <a:r>
-              <a:rPr lang="en-US" sz="1700" dirty="0">
-                <a:solidFill>
-                  <a:schemeClr val="accent2"/>
-                </a:solidFill>
-              </a:rPr>
-              <a:t>Precision and Recall</a:t>
-            </a:r>
-            <a:r>
-              <a:rPr lang="en-US" sz="1800" dirty="0">
-                <a:solidFill>
-                  <a:schemeClr val="accent2"/>
-                </a:solidFill>
-              </a:rPr>
-              <a:t>(After tradeoff)</a:t>
+              <a:rPr lang="en-US" sz="1700" dirty="0"/>
+              <a:t>	[ [ 1215,  96 ],</a:t>
+            </a:r>
+          </a:p>
+          <a:p>
+            <a:pPr marL="0" indent="0">
+              <a:buNone/>
+            </a:pPr>
+            <a:r>
+              <a:rPr lang="en-US" sz="1700" dirty="0"/>
+              <a:t>	   [92 , 712  ] ]</a:t>
             </a:r>
             <a:endParaRPr lang="en-US" sz="1700" dirty="0">
               <a:solidFill>
@@ -5089,14 +4906,36 @@
               <a:buNone/>
             </a:pPr>
             <a:r>
-              <a:rPr lang="en-US" sz="1700" dirty="0"/>
+              <a:rPr lang="en-US" sz="1800" b="1" dirty="0">
+                <a:solidFill>
+                  <a:schemeClr val="accent2"/>
+                </a:solidFill>
+              </a:rPr>
+              <a:t>Precision and Recall(After tradeoff)</a:t>
+            </a:r>
+          </a:p>
+          <a:p>
+            <a:pPr marL="457200" lvl="1" indent="0">
+              <a:buNone/>
+            </a:pPr>
+            <a:r>
+              <a:rPr lang="en-US" sz="1200" dirty="0">
+                <a:latin typeface="Arial" panose="020B0604020202020204" pitchFamily="34" charset="0"/>
+                <a:cs typeface="Arial" panose="020B0604020202020204" pitchFamily="34" charset="0"/>
+              </a:rPr>
               <a:t>Precision: 90.21%</a:t>
             </a:r>
             <a:br>
-              <a:rPr lang="en-US" sz="1700" dirty="0"/>
+              <a:rPr lang="en-US" sz="1200" dirty="0">
+                <a:latin typeface="Arial" panose="020B0604020202020204" pitchFamily="34" charset="0"/>
+                <a:cs typeface="Arial" panose="020B0604020202020204" pitchFamily="34" charset="0"/>
+              </a:rPr>
             </a:br>
             <a:r>
-              <a:rPr lang="en-US" sz="1700" dirty="0"/>
+              <a:rPr lang="en-US" sz="1200" dirty="0">
+                <a:latin typeface="Arial" panose="020B0604020202020204" pitchFamily="34" charset="0"/>
+                <a:cs typeface="Arial" panose="020B0604020202020204" pitchFamily="34" charset="0"/>
+              </a:rPr>
               <a:t>Recall: 87.18%</a:t>
             </a:r>
           </a:p>
@@ -5200,194 +5039,188 @@
           </a:bodyPr>
           <a:lstStyle/>
           <a:p>
-            <a:pPr algn="l"/>
-            <a:r>
-              <a:rPr lang="en-US" sz="1600" b="0" i="0" dirty="0">
+            <a:pPr algn="l">
+              <a:buFont typeface="Wingdings" panose="05000000000000000000" pitchFamily="2" charset="2"/>
+              <a:buChar char="Ø"/>
+            </a:pPr>
+            <a:r>
+              <a:rPr lang="en-US" sz="1200" b="0" i="0" dirty="0">
                 <a:solidFill>
                   <a:srgbClr val="000000"/>
                 </a:solidFill>
                 <a:effectLst/>
-                <a:latin typeface="Helvetica Neue"/>
+                <a:latin typeface="Arial" panose="020B0604020202020204" pitchFamily="34" charset="0"/>
+                <a:cs typeface="Arial" panose="020B0604020202020204" pitchFamily="34" charset="0"/>
               </a:rPr>
               <a:t>To improve the potential lead conversion rate X-Education will have to mainly focus important features responsible for good conversion rate are :-</a:t>
             </a:r>
           </a:p>
           <a:p>
-            <a:pPr algn="l">
-              <a:buFont typeface="Arial" panose="020B0604020202020204" pitchFamily="34" charset="0"/>
-              <a:buChar char="•"/>
-            </a:pPr>
-            <a:r>
-              <a:rPr lang="en-US" sz="1600" b="0" i="0" dirty="0">
+            <a:pPr lvl="1">
+              <a:buFont typeface="Wingdings" panose="05000000000000000000" pitchFamily="2" charset="2"/>
+              <a:buChar char="Ø"/>
+            </a:pPr>
+            <a:r>
+              <a:rPr lang="en-US" sz="1200" b="0" i="0" dirty="0">
                 <a:solidFill>
                   <a:srgbClr val="000000"/>
                 </a:solidFill>
                 <a:effectLst/>
-                <a:latin typeface="Helvetica Neue"/>
+                <a:latin typeface="Arial" panose="020B0604020202020204" pitchFamily="34" charset="0"/>
+                <a:cs typeface="Arial" panose="020B0604020202020204" pitchFamily="34" charset="0"/>
               </a:rPr>
               <a:t>Total Time Spent on Website: The customers spending more time on website can turn to be potential leads.</a:t>
             </a:r>
           </a:p>
           <a:p>
-            <a:pPr algn="l">
-              <a:buFont typeface="Arial" panose="020B0604020202020204" pitchFamily="34" charset="0"/>
-              <a:buChar char="•"/>
-            </a:pPr>
-            <a:r>
-              <a:rPr lang="en-US" sz="1600" b="0" i="0" dirty="0">
+            <a:pPr lvl="1">
+              <a:buFont typeface="Wingdings" panose="05000000000000000000" pitchFamily="2" charset="2"/>
+              <a:buChar char="Ø"/>
+            </a:pPr>
+            <a:r>
+              <a:rPr lang="en-US" sz="1200" b="0" i="0" dirty="0">
                 <a:solidFill>
                   <a:srgbClr val="000000"/>
                 </a:solidFill>
                 <a:effectLst/>
-                <a:latin typeface="Helvetica Neue"/>
+                <a:latin typeface="Arial" panose="020B0604020202020204" pitchFamily="34" charset="0"/>
+                <a:cs typeface="Arial" panose="020B0604020202020204" pitchFamily="34" charset="0"/>
               </a:rPr>
               <a:t>Lead </a:t>
             </a:r>
             <a:r>
-              <a:rPr lang="en-US" sz="1600" b="0" i="0" dirty="0" err="1">
+              <a:rPr lang="en-US" sz="1200" b="0" i="0" dirty="0" err="1">
                 <a:solidFill>
                   <a:srgbClr val="000000"/>
                 </a:solidFill>
                 <a:effectLst/>
-                <a:latin typeface="Helvetica Neue"/>
+                <a:latin typeface="Arial" panose="020B0604020202020204" pitchFamily="34" charset="0"/>
+                <a:cs typeface="Arial" panose="020B0604020202020204" pitchFamily="34" charset="0"/>
               </a:rPr>
               <a:t>Origin_Lead</a:t>
             </a:r>
             <a:r>
-              <a:rPr lang="en-US" sz="1600" b="0" i="0" dirty="0">
+              <a:rPr lang="en-US" sz="1200" b="0" i="0" dirty="0">
                 <a:solidFill>
                   <a:srgbClr val="000000"/>
                 </a:solidFill>
                 <a:effectLst/>
-                <a:latin typeface="Helvetica Neue"/>
+                <a:latin typeface="Arial" panose="020B0604020202020204" pitchFamily="34" charset="0"/>
+                <a:cs typeface="Arial" panose="020B0604020202020204" pitchFamily="34" charset="0"/>
               </a:rPr>
               <a:t> Add Form: Leads who have engaged through 'Lead Add Form' having higher conversion rate so company can focus on it.</a:t>
             </a:r>
           </a:p>
           <a:p>
-            <a:pPr algn="l">
-              <a:buFont typeface="Arial" panose="020B0604020202020204" pitchFamily="34" charset="0"/>
-              <a:buChar char="•"/>
-            </a:pPr>
-            <a:r>
-              <a:rPr lang="en-US" sz="1600" b="0" i="0" dirty="0">
+            <a:pPr lvl="1">
+              <a:buFont typeface="Wingdings" panose="05000000000000000000" pitchFamily="2" charset="2"/>
+              <a:buChar char="Ø"/>
+            </a:pPr>
+            <a:r>
+              <a:rPr lang="en-US" sz="1200" b="0" i="0" dirty="0">
                 <a:solidFill>
                   <a:srgbClr val="000000"/>
                 </a:solidFill>
                 <a:effectLst/>
-                <a:latin typeface="Helvetica Neue"/>
+                <a:latin typeface="Arial" panose="020B0604020202020204" pitchFamily="34" charset="0"/>
+                <a:cs typeface="Arial" panose="020B0604020202020204" pitchFamily="34" charset="0"/>
               </a:rPr>
               <a:t>Last </a:t>
             </a:r>
             <a:r>
-              <a:rPr lang="en-US" sz="1600" b="0" i="0" dirty="0" err="1">
+              <a:rPr lang="en-US" sz="1200" b="0" i="0" dirty="0" err="1">
                 <a:solidFill>
                   <a:srgbClr val="000000"/>
                 </a:solidFill>
                 <a:effectLst/>
-                <a:latin typeface="Helvetica Neue"/>
+                <a:latin typeface="Arial" panose="020B0604020202020204" pitchFamily="34" charset="0"/>
+                <a:cs typeface="Arial" panose="020B0604020202020204" pitchFamily="34" charset="0"/>
               </a:rPr>
               <a:t>Activity_Converted</a:t>
             </a:r>
             <a:r>
-              <a:rPr lang="en-US" sz="1600" b="0" i="0" dirty="0">
+              <a:rPr lang="en-US" sz="1200" b="0" i="0" dirty="0">
                 <a:solidFill>
                   <a:srgbClr val="000000"/>
                 </a:solidFill>
                 <a:effectLst/>
-                <a:latin typeface="Helvetica Neue"/>
+                <a:latin typeface="Arial" panose="020B0604020202020204" pitchFamily="34" charset="0"/>
+                <a:cs typeface="Arial" panose="020B0604020202020204" pitchFamily="34" charset="0"/>
               </a:rPr>
               <a:t> to Lead: The last activity by the customer who successfully converted to lead.</a:t>
             </a:r>
           </a:p>
           <a:p>
-            <a:pPr algn="l">
-              <a:buFont typeface="Arial" panose="020B0604020202020204" pitchFamily="34" charset="0"/>
-              <a:buChar char="•"/>
-            </a:pPr>
-            <a:r>
-              <a:rPr lang="en-US" sz="1600" b="0" i="0" dirty="0" err="1">
+            <a:pPr lvl="1">
+              <a:buFont typeface="Wingdings" panose="05000000000000000000" pitchFamily="2" charset="2"/>
+              <a:buChar char="Ø"/>
+            </a:pPr>
+            <a:r>
+              <a:rPr lang="en-US" sz="1200" b="0" i="0" dirty="0" err="1">
                 <a:solidFill>
                   <a:srgbClr val="000000"/>
                 </a:solidFill>
                 <a:effectLst/>
-                <a:latin typeface="Helvetica Neue"/>
+                <a:latin typeface="Arial" panose="020B0604020202020204" pitchFamily="34" charset="0"/>
+                <a:cs typeface="Arial" panose="020B0604020202020204" pitchFamily="34" charset="0"/>
               </a:rPr>
               <a:t>Tags_Closed</a:t>
             </a:r>
             <a:r>
-              <a:rPr lang="en-US" sz="1600" b="0" i="0" dirty="0">
+              <a:rPr lang="en-US" sz="1200" b="0" i="0" dirty="0">
                 <a:solidFill>
                   <a:srgbClr val="000000"/>
                 </a:solidFill>
                 <a:effectLst/>
-                <a:latin typeface="Helvetica Neue"/>
+                <a:latin typeface="Arial" panose="020B0604020202020204" pitchFamily="34" charset="0"/>
+                <a:cs typeface="Arial" panose="020B0604020202020204" pitchFamily="34" charset="0"/>
               </a:rPr>
               <a:t> by </a:t>
             </a:r>
             <a:r>
-              <a:rPr lang="en-US" sz="1600" b="0" i="0" dirty="0" err="1">
+              <a:rPr lang="en-US" sz="1200" b="0" i="0" dirty="0" err="1">
                 <a:solidFill>
                   <a:srgbClr val="000000"/>
                 </a:solidFill>
                 <a:effectLst/>
-                <a:latin typeface="Helvetica Neue"/>
+                <a:latin typeface="Arial" panose="020B0604020202020204" pitchFamily="34" charset="0"/>
+                <a:cs typeface="Arial" panose="020B0604020202020204" pitchFamily="34" charset="0"/>
               </a:rPr>
               <a:t>Horizzon</a:t>
             </a:r>
             <a:r>
-              <a:rPr lang="en-US" sz="1600" b="0" i="0" dirty="0">
+              <a:rPr lang="en-US" sz="1200" b="0" i="0" dirty="0">
                 <a:solidFill>
                   <a:srgbClr val="000000"/>
                 </a:solidFill>
                 <a:effectLst/>
-                <a:latin typeface="Helvetica Neue"/>
+                <a:latin typeface="Arial" panose="020B0604020202020204" pitchFamily="34" charset="0"/>
+                <a:cs typeface="Arial" panose="020B0604020202020204" pitchFamily="34" charset="0"/>
               </a:rPr>
               <a:t>: The converted leads that are closed by </a:t>
             </a:r>
             <a:r>
-              <a:rPr lang="en-US" sz="1600" b="0" i="0" dirty="0" err="1">
+              <a:rPr lang="en-US" sz="1200" b="0" i="0" dirty="0" err="1">
                 <a:solidFill>
                   <a:srgbClr val="000000"/>
                 </a:solidFill>
                 <a:effectLst/>
-                <a:latin typeface="Helvetica Neue"/>
+                <a:latin typeface="Arial" panose="020B0604020202020204" pitchFamily="34" charset="0"/>
+                <a:cs typeface="Arial" panose="020B0604020202020204" pitchFamily="34" charset="0"/>
               </a:rPr>
               <a:t>Horizzon</a:t>
             </a:r>
             <a:r>
-              <a:rPr lang="en-US" sz="1600" b="0" i="0" dirty="0">
+              <a:rPr lang="en-US" sz="1200" b="0" i="0" dirty="0">
                 <a:solidFill>
                   <a:srgbClr val="000000"/>
                 </a:solidFill>
                 <a:effectLst/>
-                <a:latin typeface="Helvetica Neue"/>
-              </a:rPr>
-              <a:t> as they play major role in </a:t>
-            </a:r>
-            <a:r>
-              <a:rPr lang="en-US" sz="1600" b="0" i="0" dirty="0" err="1">
-                <a:solidFill>
-                  <a:srgbClr val="000000"/>
-                </a:solidFill>
-                <a:effectLst/>
-                <a:latin typeface="Helvetica Neue"/>
-              </a:rPr>
-              <a:t>convertion</a:t>
-            </a:r>
-            <a:r>
-              <a:rPr lang="en-US" sz="1600" b="0" i="0" dirty="0">
-                <a:solidFill>
-                  <a:srgbClr val="000000"/>
-                </a:solidFill>
-                <a:effectLst/>
-                <a:latin typeface="Helvetica Neue"/>
-              </a:rPr>
-              <a:t>.</a:t>
-            </a:r>
-          </a:p>
-          <a:p>
-            <a:endParaRPr lang="en-US" dirty="0"/>
+                <a:latin typeface="Arial" panose="020B0604020202020204" pitchFamily="34" charset="0"/>
+                <a:cs typeface="Arial" panose="020B0604020202020204" pitchFamily="34" charset="0"/>
+              </a:rPr>
+              <a:t> as they play major role in conversion.</a:t>
+            </a:r>
           </a:p>
         </p:txBody>
       </p:sp>
@@ -5555,7 +5388,10 @@
               <a:buChar char="-"/>
             </a:pPr>
             <a:r>
-              <a:rPr lang="en-US" dirty="0"/>
+              <a:rPr lang="en-US" dirty="0">
+                <a:latin typeface="Arial" panose="020B0604020202020204" pitchFamily="34" charset="0"/>
+                <a:cs typeface="Arial" panose="020B0604020202020204" pitchFamily="34" charset="0"/>
+              </a:rPr>
               <a:t>Giridhar Challa</a:t>
             </a:r>
           </a:p>
@@ -5565,7 +5401,10 @@
               <a:buChar char="-"/>
             </a:pPr>
             <a:r>
-              <a:rPr lang="en-US" dirty="0"/>
+              <a:rPr lang="en-US" dirty="0">
+                <a:latin typeface="Arial" panose="020B0604020202020204" pitchFamily="34" charset="0"/>
+                <a:cs typeface="Arial" panose="020B0604020202020204" pitchFamily="34" charset="0"/>
+              </a:rPr>
               <a:t>Ganesh Behera</a:t>
             </a:r>
           </a:p>
@@ -5575,7 +5414,10 @@
               <a:buChar char="-"/>
             </a:pPr>
             <a:r>
-              <a:rPr lang="en-US" dirty="0"/>
+              <a:rPr lang="en-US" dirty="0">
+                <a:latin typeface="Arial" panose="020B0604020202020204" pitchFamily="34" charset="0"/>
+                <a:cs typeface="Arial" panose="020B0604020202020204" pitchFamily="34" charset="0"/>
+              </a:rPr>
               <a:t>Vinay Kumar Sharma</a:t>
             </a:r>
           </a:p>
@@ -5715,8 +5557,12 @@
           </a:bodyPr>
           <a:lstStyle/>
           <a:p>
-            <a:r>
-              <a:rPr lang="en-US" sz="1600" b="0" i="0" dirty="0">
+            <a:pPr>
+              <a:buFont typeface="Wingdings" panose="05000000000000000000" pitchFamily="2" charset="2"/>
+              <a:buChar char="Ø"/>
+            </a:pPr>
+            <a:r>
+              <a:rPr lang="en-US" sz="1200" b="0" i="0" dirty="0">
                 <a:solidFill>
                   <a:srgbClr val="091E42"/>
                 </a:solidFill>
@@ -5728,8 +5574,12 @@
             </a:r>
           </a:p>
           <a:p>
-            <a:r>
-              <a:rPr lang="en-US" sz="1600" dirty="0">
+            <a:pPr>
+              <a:buFont typeface="Wingdings" panose="05000000000000000000" pitchFamily="2" charset="2"/>
+              <a:buChar char="Ø"/>
+            </a:pPr>
+            <a:r>
+              <a:rPr lang="en-US" sz="1200" dirty="0">
                 <a:solidFill>
                   <a:srgbClr val="091E42"/>
                 </a:solidFill>
@@ -5740,8 +5590,12 @@
             </a:r>
           </a:p>
           <a:p>
-            <a:r>
-              <a:rPr lang="en-US" sz="1600" b="0" i="0" dirty="0">
+            <a:pPr>
+              <a:buFont typeface="Wingdings" panose="05000000000000000000" pitchFamily="2" charset="2"/>
+              <a:buChar char="Ø"/>
+            </a:pPr>
+            <a:r>
+              <a:rPr lang="en-US" sz="1200" b="0" i="0" dirty="0">
                 <a:solidFill>
                   <a:srgbClr val="000000"/>
                 </a:solidFill>
@@ -5751,7 +5605,7 @@
               </a:rPr>
               <a:t>An X Education need help to select the most promising leads, i.e. the leads that are most likely to convert into paying customers. The company requires us to build a model wherein you need to assign a lead score to each of the leads such that the customers with higher lead score have a higher conversion chance and the customers with lower lead score have a lower conversion chance. The CEO, in particular, has given a ballpark of the target lead conversion rate to be around 80%.</a:t>
             </a:r>
-            <a:endParaRPr lang="en-US" sz="1600" dirty="0">
+            <a:endParaRPr lang="en-US" sz="1200" dirty="0">
               <a:latin typeface="Arial" panose="020B0604020202020204" pitchFamily="34" charset="0"/>
               <a:cs typeface="Arial" panose="020B0604020202020204" pitchFamily="34" charset="0"/>
             </a:endParaRPr>
@@ -5794,6 +5648,42 @@
           <a:chExt cx="0" cy="0"/>
         </a:xfrm>
       </p:grpSpPr>
+      <p:pic>
+        <p:nvPicPr>
+          <p:cNvPr id="5" name="Picture 4">
+            <a:extLst>
+              <a:ext uri="{FF2B5EF4-FFF2-40B4-BE49-F238E27FC236}">
+                <a16:creationId xmlns:a16="http://schemas.microsoft.com/office/drawing/2014/main" id="{3CF1C8FB-BF07-EDF3-CFF3-70CA6AFB680F}"/>
+              </a:ext>
+            </a:extLst>
+          </p:cNvPr>
+          <p:cNvPicPr>
+            <a:picLocks noChangeAspect="1"/>
+          </p:cNvPicPr>
+          <p:nvPr/>
+        </p:nvPicPr>
+        <p:blipFill>
+          <a:blip r:embed="rId2">
+            <a:extLst>
+              <a:ext uri="{28A0092B-C50C-407E-A947-70E740481C1C}">
+                <a14:useLocalDpi xmlns:a14="http://schemas.microsoft.com/office/drawing/2010/main" val="0"/>
+              </a:ext>
+            </a:extLst>
+          </a:blip>
+          <a:stretch>
+            <a:fillRect/>
+          </a:stretch>
+        </p:blipFill>
+        <p:spPr>
+          <a:xfrm>
+            <a:off x="6875929" y="1244655"/>
+            <a:ext cx="4798360" cy="5080616"/>
+          </a:xfrm>
+          <a:prstGeom prst="rect">
+            <a:avLst/>
+          </a:prstGeom>
+        </p:spPr>
+      </p:pic>
       <p:sp>
         <p:nvSpPr>
           <p:cNvPr id="2" name="Title 1">
@@ -5857,12 +5747,16 @@
         </p:spPr>
         <p:txBody>
           <a:bodyPr>
-            <a:normAutofit fontScale="77500" lnSpcReduction="20000"/>
+            <a:noAutofit/>
           </a:bodyPr>
           <a:lstStyle/>
           <a:p>
-            <a:r>
-              <a:rPr lang="en-US" sz="1600" dirty="0">
+            <a:pPr>
+              <a:buFont typeface="Wingdings" panose="05000000000000000000" pitchFamily="2" charset="2"/>
+              <a:buChar char="Ø"/>
+            </a:pPr>
+            <a:r>
+              <a:rPr lang="en-US" sz="1000" dirty="0">
                 <a:latin typeface="Arial" panose="020B0604020202020204" pitchFamily="34" charset="0"/>
                 <a:cs typeface="Arial" panose="020B0604020202020204" pitchFamily="34" charset="0"/>
               </a:rPr>
@@ -5870,8 +5764,12 @@
             </a:r>
           </a:p>
           <a:p>
-            <a:r>
-              <a:rPr lang="en-US" sz="1600" dirty="0">
+            <a:pPr>
+              <a:buFont typeface="Wingdings" panose="05000000000000000000" pitchFamily="2" charset="2"/>
+              <a:buChar char="Ø"/>
+            </a:pPr>
+            <a:r>
+              <a:rPr lang="en-US" sz="1000" dirty="0">
                 <a:latin typeface="Arial" panose="020B0604020202020204" pitchFamily="34" charset="0"/>
                 <a:cs typeface="Arial" panose="020B0604020202020204" pitchFamily="34" charset="0"/>
               </a:rPr>
@@ -5879,9 +5777,12 @@
             </a:r>
           </a:p>
           <a:p>
-            <a:pPr lvl="1"/>
-            <a:r>
-              <a:rPr lang="en-US" sz="1200" dirty="0">
+            <a:pPr lvl="1">
+              <a:buFont typeface="Wingdings" panose="05000000000000000000" pitchFamily="2" charset="2"/>
+              <a:buChar char="Ø"/>
+            </a:pPr>
+            <a:r>
+              <a:rPr lang="en-US" sz="1000" dirty="0">
                 <a:latin typeface="Arial" panose="020B0604020202020204" pitchFamily="34" charset="0"/>
                 <a:cs typeface="Arial" panose="020B0604020202020204" pitchFamily="34" charset="0"/>
               </a:rPr>
@@ -5889,9 +5790,12 @@
             </a:r>
           </a:p>
           <a:p>
-            <a:pPr lvl="1"/>
-            <a:r>
-              <a:rPr lang="en-US" sz="1200" dirty="0">
+            <a:pPr lvl="1">
+              <a:buFont typeface="Wingdings" panose="05000000000000000000" pitchFamily="2" charset="2"/>
+              <a:buChar char="Ø"/>
+            </a:pPr>
+            <a:r>
+              <a:rPr lang="en-US" sz="1000" dirty="0">
                 <a:latin typeface="Arial" panose="020B0604020202020204" pitchFamily="34" charset="0"/>
                 <a:cs typeface="Arial" panose="020B0604020202020204" pitchFamily="34" charset="0"/>
               </a:rPr>
@@ -5899,9 +5803,12 @@
             </a:r>
           </a:p>
           <a:p>
-            <a:pPr lvl="1"/>
-            <a:r>
-              <a:rPr lang="en-US" sz="1200" dirty="0">
+            <a:pPr lvl="1">
+              <a:buFont typeface="Wingdings" panose="05000000000000000000" pitchFamily="2" charset="2"/>
+              <a:buChar char="Ø"/>
+            </a:pPr>
+            <a:r>
+              <a:rPr lang="en-US" sz="1000" dirty="0">
                 <a:latin typeface="Arial" panose="020B0604020202020204" pitchFamily="34" charset="0"/>
                 <a:cs typeface="Arial" panose="020B0604020202020204" pitchFamily="34" charset="0"/>
               </a:rPr>
@@ -5909,9 +5816,12 @@
             </a:r>
           </a:p>
           <a:p>
-            <a:pPr lvl="1"/>
-            <a:r>
-              <a:rPr lang="en-US" sz="1200" dirty="0">
+            <a:pPr lvl="1">
+              <a:buFont typeface="Wingdings" panose="05000000000000000000" pitchFamily="2" charset="2"/>
+              <a:buChar char="Ø"/>
+            </a:pPr>
+            <a:r>
+              <a:rPr lang="en-US" sz="1000" dirty="0">
                 <a:latin typeface="Arial" panose="020B0604020202020204" pitchFamily="34" charset="0"/>
                 <a:cs typeface="Arial" panose="020B0604020202020204" pitchFamily="34" charset="0"/>
               </a:rPr>
@@ -5919,22 +5829,25 @@
             </a:r>
           </a:p>
           <a:p>
-            <a:pPr lvl="1"/>
-            <a:r>
-              <a:rPr lang="en-US" sz="1200" dirty="0">
+            <a:pPr lvl="1">
+              <a:buFont typeface="Wingdings" panose="05000000000000000000" pitchFamily="2" charset="2"/>
+              <a:buChar char="Ø"/>
+            </a:pPr>
+            <a:r>
+              <a:rPr lang="en-US" sz="1000" dirty="0">
                 <a:latin typeface="Arial" panose="020B0604020202020204" pitchFamily="34" charset="0"/>
                 <a:cs typeface="Arial" panose="020B0604020202020204" pitchFamily="34" charset="0"/>
               </a:rPr>
               <a:t>Check for outliers and impute data</a:t>
             </a:r>
-            <a:endParaRPr lang="en-US" sz="1600" dirty="0">
-              <a:latin typeface="Arial" panose="020B0604020202020204" pitchFamily="34" charset="0"/>
-              <a:cs typeface="Arial" panose="020B0604020202020204" pitchFamily="34" charset="0"/>
-            </a:endParaRPr>
-          </a:p>
-          <a:p>
-            <a:r>
-              <a:rPr lang="en-US" sz="1600" dirty="0">
+          </a:p>
+          <a:p>
+            <a:pPr>
+              <a:buFont typeface="Wingdings" panose="05000000000000000000" pitchFamily="2" charset="2"/>
+              <a:buChar char="Ø"/>
+            </a:pPr>
+            <a:r>
+              <a:rPr lang="en-US" sz="1000" dirty="0">
                 <a:latin typeface="Arial" panose="020B0604020202020204" pitchFamily="34" charset="0"/>
                 <a:cs typeface="Arial" panose="020B0604020202020204" pitchFamily="34" charset="0"/>
               </a:rPr>
@@ -5942,9 +5855,12 @@
             </a:r>
           </a:p>
           <a:p>
-            <a:pPr lvl="1"/>
-            <a:r>
-              <a:rPr lang="en-US" sz="1200" dirty="0">
+            <a:pPr lvl="1">
+              <a:buFont typeface="Wingdings" panose="05000000000000000000" pitchFamily="2" charset="2"/>
+              <a:buChar char="Ø"/>
+            </a:pPr>
+            <a:r>
+              <a:rPr lang="en-US" sz="1000" dirty="0">
                 <a:latin typeface="Arial" panose="020B0604020202020204" pitchFamily="34" charset="0"/>
                 <a:cs typeface="Arial" panose="020B0604020202020204" pitchFamily="34" charset="0"/>
               </a:rPr>
@@ -5952,22 +5868,25 @@
             </a:r>
           </a:p>
           <a:p>
-            <a:pPr lvl="1"/>
-            <a:r>
-              <a:rPr lang="en-US" sz="1200" dirty="0">
+            <a:pPr lvl="1">
+              <a:buFont typeface="Wingdings" panose="05000000000000000000" pitchFamily="2" charset="2"/>
+              <a:buChar char="Ø"/>
+            </a:pPr>
+            <a:r>
+              <a:rPr lang="en-US" sz="1000" dirty="0">
                 <a:latin typeface="Arial" panose="020B0604020202020204" pitchFamily="34" charset="0"/>
                 <a:cs typeface="Arial" panose="020B0604020202020204" pitchFamily="34" charset="0"/>
               </a:rPr>
               <a:t>Bivariate analysis</a:t>
             </a:r>
-            <a:endParaRPr lang="en-US" sz="1600" dirty="0">
-              <a:latin typeface="Arial" panose="020B0604020202020204" pitchFamily="34" charset="0"/>
-              <a:cs typeface="Arial" panose="020B0604020202020204" pitchFamily="34" charset="0"/>
-            </a:endParaRPr>
-          </a:p>
-          <a:p>
-            <a:r>
-              <a:rPr lang="en-US" sz="1600" dirty="0">
+          </a:p>
+          <a:p>
+            <a:pPr>
+              <a:buFont typeface="Wingdings" panose="05000000000000000000" pitchFamily="2" charset="2"/>
+              <a:buChar char="Ø"/>
+            </a:pPr>
+            <a:r>
+              <a:rPr lang="en-US" sz="1000" dirty="0">
                 <a:latin typeface="Arial" panose="020B0604020202020204" pitchFamily="34" charset="0"/>
                 <a:cs typeface="Arial" panose="020B0604020202020204" pitchFamily="34" charset="0"/>
               </a:rPr>
@@ -5975,9 +5894,12 @@
             </a:r>
           </a:p>
           <a:p>
-            <a:pPr lvl="1"/>
-            <a:r>
-              <a:rPr lang="en-US" sz="1200" dirty="0">
+            <a:pPr lvl="1">
+              <a:buFont typeface="Wingdings" panose="05000000000000000000" pitchFamily="2" charset="2"/>
+              <a:buChar char="Ø"/>
+            </a:pPr>
+            <a:r>
+              <a:rPr lang="en-US" sz="1000" dirty="0">
                 <a:latin typeface="Arial" panose="020B0604020202020204" pitchFamily="34" charset="0"/>
                 <a:cs typeface="Arial" panose="020B0604020202020204" pitchFamily="34" charset="0"/>
               </a:rPr>
@@ -5985,9 +5907,12 @@
             </a:r>
           </a:p>
           <a:p>
-            <a:pPr lvl="1"/>
-            <a:r>
-              <a:rPr lang="en-US" sz="1200" dirty="0">
+            <a:pPr lvl="1">
+              <a:buFont typeface="Wingdings" panose="05000000000000000000" pitchFamily="2" charset="2"/>
+              <a:buChar char="Ø"/>
+            </a:pPr>
+            <a:r>
+              <a:rPr lang="en-US" sz="1000" dirty="0">
                 <a:latin typeface="Arial" panose="020B0604020202020204" pitchFamily="34" charset="0"/>
                 <a:cs typeface="Arial" panose="020B0604020202020204" pitchFamily="34" charset="0"/>
               </a:rPr>
@@ -5999,22 +5924,24 @@
               <a:spcBef>
                 <a:spcPts val="1000"/>
               </a:spcBef>
-            </a:pPr>
-            <a:r>
-              <a:rPr lang="en-US" sz="1600" dirty="0">
+              <a:buFont typeface="Wingdings" panose="05000000000000000000" pitchFamily="2" charset="2"/>
+              <a:buChar char="Ø"/>
+            </a:pPr>
+            <a:r>
+              <a:rPr lang="en-US" sz="1000" dirty="0">
                 <a:latin typeface="Arial" panose="020B0604020202020204" pitchFamily="34" charset="0"/>
                 <a:cs typeface="Arial" panose="020B0604020202020204" pitchFamily="34" charset="0"/>
               </a:rPr>
               <a:t>Model Building using RFE and make use of </a:t>
             </a:r>
             <a:r>
-              <a:rPr lang="en-US" sz="1600" dirty="0" err="1">
+              <a:rPr lang="en-US" sz="1000" dirty="0" err="1">
                 <a:latin typeface="Arial" panose="020B0604020202020204" pitchFamily="34" charset="0"/>
                 <a:cs typeface="Arial" panose="020B0604020202020204" pitchFamily="34" charset="0"/>
               </a:rPr>
               <a:t>StatsModel</a:t>
             </a:r>
-            <a:endParaRPr lang="en-US" sz="1600" dirty="0">
+            <a:endParaRPr lang="en-US" sz="1000" dirty="0">
               <a:latin typeface="Arial" panose="020B0604020202020204" pitchFamily="34" charset="0"/>
               <a:cs typeface="Arial" panose="020B0604020202020204" pitchFamily="34" charset="0"/>
             </a:endParaRPr>
@@ -6024,9 +5951,11 @@
               <a:spcBef>
                 <a:spcPts val="1000"/>
               </a:spcBef>
-            </a:pPr>
-            <a:r>
-              <a:rPr lang="en-US" sz="1200" dirty="0">
+              <a:buFont typeface="Wingdings" panose="05000000000000000000" pitchFamily="2" charset="2"/>
+              <a:buChar char="Ø"/>
+            </a:pPr>
+            <a:r>
+              <a:rPr lang="en-US" sz="1000" dirty="0">
                 <a:latin typeface="Arial" panose="020B0604020202020204" pitchFamily="34" charset="0"/>
                 <a:cs typeface="Arial" panose="020B0604020202020204" pitchFamily="34" charset="0"/>
               </a:rPr>
@@ -6038,9 +5967,11 @@
               <a:spcBef>
                 <a:spcPts val="1000"/>
               </a:spcBef>
-            </a:pPr>
-            <a:r>
-              <a:rPr lang="en-US" sz="1600" dirty="0">
+              <a:buFont typeface="Wingdings" panose="05000000000000000000" pitchFamily="2" charset="2"/>
+              <a:buChar char="Ø"/>
+            </a:pPr>
+            <a:r>
+              <a:rPr lang="en-US" sz="1000" dirty="0">
                 <a:latin typeface="Arial" panose="020B0604020202020204" pitchFamily="34" charset="0"/>
                 <a:cs typeface="Arial" panose="020B0604020202020204" pitchFamily="34" charset="0"/>
               </a:rPr>
@@ -6052,9 +5983,11 @@
               <a:spcBef>
                 <a:spcPts val="1000"/>
               </a:spcBef>
-            </a:pPr>
-            <a:r>
-              <a:rPr lang="en-US" sz="1200" dirty="0">
+              <a:buFont typeface="Wingdings" panose="05000000000000000000" pitchFamily="2" charset="2"/>
+              <a:buChar char="Ø"/>
+            </a:pPr>
+            <a:r>
+              <a:rPr lang="en-US" sz="1000" dirty="0">
                 <a:latin typeface="Arial" panose="020B0604020202020204" pitchFamily="34" charset="0"/>
                 <a:cs typeface="Arial" panose="020B0604020202020204" pitchFamily="34" charset="0"/>
               </a:rPr>
@@ -6066,20 +5999,15 @@
               <a:spcBef>
                 <a:spcPts val="1000"/>
               </a:spcBef>
-            </a:pPr>
-            <a:r>
-              <a:rPr lang="en-US" sz="1200" dirty="0">
-                <a:latin typeface="Arial" panose="020B0604020202020204" pitchFamily="34" charset="0"/>
-                <a:cs typeface="Arial" panose="020B0604020202020204" pitchFamily="34" charset="0"/>
-              </a:rPr>
-              <a:t>Optimal cutoff point for Accuracy Sensitivity and Specificity</a:t>
-            </a:r>
-            <a:r>
-              <a:rPr lang="en-US" sz="1600" dirty="0">
-                <a:latin typeface="Arial" panose="020B0604020202020204" pitchFamily="34" charset="0"/>
-                <a:cs typeface="Arial" panose="020B0604020202020204" pitchFamily="34" charset="0"/>
-              </a:rPr>
-              <a:t>	</a:t>
+              <a:buFont typeface="Wingdings" panose="05000000000000000000" pitchFamily="2" charset="2"/>
+              <a:buChar char="Ø"/>
+            </a:pPr>
+            <a:r>
+              <a:rPr lang="en-US" sz="1000" dirty="0">
+                <a:latin typeface="Arial" panose="020B0604020202020204" pitchFamily="34" charset="0"/>
+                <a:cs typeface="Arial" panose="020B0604020202020204" pitchFamily="34" charset="0"/>
+              </a:rPr>
+              <a:t>Optimal cutoff point for Accuracy Sensitivity and Specificity	</a:t>
             </a:r>
           </a:p>
           <a:p>
@@ -6087,9 +6015,11 @@
               <a:spcBef>
                 <a:spcPts val="1000"/>
               </a:spcBef>
-            </a:pPr>
-            <a:r>
-              <a:rPr lang="en-US" sz="1600" dirty="0">
+              <a:buFont typeface="Wingdings" panose="05000000000000000000" pitchFamily="2" charset="2"/>
+              <a:buChar char="Ø"/>
+            </a:pPr>
+            <a:r>
+              <a:rPr lang="en-US" sz="1000" dirty="0">
                 <a:latin typeface="Arial" panose="020B0604020202020204" pitchFamily="34" charset="0"/>
                 <a:cs typeface="Arial" panose="020B0604020202020204" pitchFamily="34" charset="0"/>
               </a:rPr>
@@ -6101,9 +6031,11 @@
               <a:spcBef>
                 <a:spcPts val="1000"/>
               </a:spcBef>
-            </a:pPr>
-            <a:r>
-              <a:rPr lang="en-US" sz="1600" dirty="0">
+              <a:buFont typeface="Wingdings" panose="05000000000000000000" pitchFamily="2" charset="2"/>
+              <a:buChar char="Ø"/>
+            </a:pPr>
+            <a:r>
+              <a:rPr lang="en-US" sz="1000" dirty="0">
                 <a:latin typeface="Arial" panose="020B0604020202020204" pitchFamily="34" charset="0"/>
                 <a:cs typeface="Arial" panose="020B0604020202020204" pitchFamily="34" charset="0"/>
               </a:rPr>
@@ -6115,27 +6047,27 @@
               <a:spcBef>
                 <a:spcPts val="1000"/>
               </a:spcBef>
-            </a:pPr>
-            <a:r>
-              <a:rPr lang="en-US" sz="1200" dirty="0">
+              <a:buFont typeface="Wingdings" panose="05000000000000000000" pitchFamily="2" charset="2"/>
+              <a:buChar char="Ø"/>
+            </a:pPr>
+            <a:r>
+              <a:rPr lang="en-US" sz="1000" dirty="0">
                 <a:latin typeface="Arial" panose="020B0604020202020204" pitchFamily="34" charset="0"/>
                 <a:cs typeface="Arial" panose="020B0604020202020204" pitchFamily="34" charset="0"/>
               </a:rPr>
               <a:t>Precision and Recall tradeoff</a:t>
             </a:r>
-            <a:endParaRPr lang="en-US" sz="1500" dirty="0">
-              <a:latin typeface="Arial" panose="020B0604020202020204" pitchFamily="34" charset="0"/>
-              <a:cs typeface="Arial" panose="020B0604020202020204" pitchFamily="34" charset="0"/>
-            </a:endParaRPr>
           </a:p>
           <a:p>
             <a:pPr marL="285750" lvl="1" indent="-285750">
               <a:spcBef>
                 <a:spcPts val="1000"/>
               </a:spcBef>
-            </a:pPr>
-            <a:r>
-              <a:rPr lang="en-US" sz="1600" dirty="0">
+              <a:buFont typeface="Wingdings" panose="05000000000000000000" pitchFamily="2" charset="2"/>
+              <a:buChar char="Ø"/>
+            </a:pPr>
+            <a:r>
+              <a:rPr lang="en-US" sz="1000" dirty="0">
                 <a:latin typeface="Arial" panose="020B0604020202020204" pitchFamily="34" charset="0"/>
                 <a:cs typeface="Arial" panose="020B0604020202020204" pitchFamily="34" charset="0"/>
               </a:rPr>
@@ -6143,19 +6075,21 @@
             </a:r>
           </a:p>
           <a:p>
-            <a:pPr marL="457200" lvl="1" indent="0">
-              <a:buNone/>
-            </a:pPr>
-            <a:endParaRPr lang="en-US" sz="1200" dirty="0">
+            <a:pPr lvl="1">
+              <a:buFont typeface="Wingdings" panose="05000000000000000000" pitchFamily="2" charset="2"/>
+              <a:buChar char="Ø"/>
+            </a:pPr>
+            <a:endParaRPr lang="en-US" sz="1000" dirty="0">
               <a:latin typeface="Arial" panose="020B0604020202020204" pitchFamily="34" charset="0"/>
               <a:cs typeface="Arial" panose="020B0604020202020204" pitchFamily="34" charset="0"/>
             </a:endParaRPr>
           </a:p>
           <a:p>
-            <a:pPr marL="457200" lvl="1" indent="0">
-              <a:buNone/>
-            </a:pPr>
-            <a:endParaRPr lang="en-US" sz="1200" dirty="0">
+            <a:pPr lvl="1">
+              <a:buFont typeface="Wingdings" panose="05000000000000000000" pitchFamily="2" charset="2"/>
+              <a:buChar char="Ø"/>
+            </a:pPr>
+            <a:endParaRPr lang="en-US" sz="1000" dirty="0">
               <a:latin typeface="Arial" panose="020B0604020202020204" pitchFamily="34" charset="0"/>
               <a:cs typeface="Arial" panose="020B0604020202020204" pitchFamily="34" charset="0"/>
             </a:endParaRPr>
@@ -6261,33 +6195,160 @@
           </a:bodyPr>
           <a:lstStyle/>
           <a:p>
-            <a:r>
-              <a:rPr lang="en-US" sz="1600" dirty="0"/>
+            <a:pPr>
+              <a:buFont typeface="Wingdings" panose="05000000000000000000" pitchFamily="2" charset="2"/>
+              <a:buChar char="Ø"/>
+            </a:pPr>
+            <a:r>
+              <a:rPr lang="en-US" sz="1200" dirty="0">
+                <a:latin typeface="Arial" panose="020B0604020202020204" pitchFamily="34" charset="0"/>
+                <a:cs typeface="Arial" panose="020B0604020202020204" pitchFamily="34" charset="0"/>
+              </a:rPr>
               <a:t>The dataset used for the problem is “leads.csv” which has 37 columns(features)</a:t>
             </a:r>
           </a:p>
           <a:p>
-            <a:r>
-              <a:rPr lang="en-US" sz="1600" dirty="0"/>
-              <a:t>5 columns which has more than 40% missing data are dropped</a:t>
-            </a:r>
-          </a:p>
-          <a:p>
-            <a:r>
-              <a:rPr lang="en-US" sz="1600" dirty="0"/>
-              <a:t>14 columns which are having unique values and highly imbalanced columns are removed</a:t>
-            </a:r>
-          </a:p>
-          <a:p>
-            <a:pPr lvl="1"/>
-            <a:r>
-              <a:rPr lang="en-US" sz="1100" dirty="0"/>
+            <a:pPr>
+              <a:buFont typeface="Wingdings" panose="05000000000000000000" pitchFamily="2" charset="2"/>
+              <a:buChar char="Ø"/>
+            </a:pPr>
+            <a:r>
+              <a:rPr lang="en-US" sz="1200" dirty="0">
+                <a:latin typeface="Arial" panose="020B0604020202020204" pitchFamily="34" charset="0"/>
+                <a:cs typeface="Arial" panose="020B0604020202020204" pitchFamily="34" charset="0"/>
+              </a:rPr>
+              <a:t>5 columns which has more than 40% missing data has been dropped </a:t>
+            </a:r>
+          </a:p>
+          <a:p>
+            <a:pPr lvl="1">
+              <a:buFont typeface="Wingdings" panose="05000000000000000000" pitchFamily="2" charset="2"/>
+              <a:buChar char="Ø"/>
+            </a:pPr>
+            <a:r>
+              <a:rPr lang="en-US" sz="1200" dirty="0" err="1">
+                <a:latin typeface="Arial" panose="020B0604020202020204" pitchFamily="34" charset="0"/>
+                <a:cs typeface="Arial" panose="020B0604020202020204" pitchFamily="34" charset="0"/>
+              </a:rPr>
+              <a:t>Asymmetrique</a:t>
+            </a:r>
+            <a:r>
+              <a:rPr lang="en-US" sz="1200" dirty="0">
+                <a:latin typeface="Arial" panose="020B0604020202020204" pitchFamily="34" charset="0"/>
+                <a:cs typeface="Arial" panose="020B0604020202020204" pitchFamily="34" charset="0"/>
+              </a:rPr>
+              <a:t> Activity Index</a:t>
+            </a:r>
+          </a:p>
+          <a:p>
+            <a:pPr lvl="1">
+              <a:buFont typeface="Wingdings" panose="05000000000000000000" pitchFamily="2" charset="2"/>
+              <a:buChar char="Ø"/>
+            </a:pPr>
+            <a:r>
+              <a:rPr lang="en-US" sz="1200" dirty="0" err="1">
+                <a:latin typeface="Arial" panose="020B0604020202020204" pitchFamily="34" charset="0"/>
+                <a:cs typeface="Arial" panose="020B0604020202020204" pitchFamily="34" charset="0"/>
+              </a:rPr>
+              <a:t>Asymmetrique</a:t>
+            </a:r>
+            <a:r>
+              <a:rPr lang="en-US" sz="1200" dirty="0">
+                <a:latin typeface="Arial" panose="020B0604020202020204" pitchFamily="34" charset="0"/>
+                <a:cs typeface="Arial" panose="020B0604020202020204" pitchFamily="34" charset="0"/>
+              </a:rPr>
+              <a:t> Profile Index</a:t>
+            </a:r>
+          </a:p>
+          <a:p>
+            <a:pPr lvl="1">
+              <a:buFont typeface="Wingdings" panose="05000000000000000000" pitchFamily="2" charset="2"/>
+              <a:buChar char="Ø"/>
+            </a:pPr>
+            <a:r>
+              <a:rPr lang="en-US" sz="1200" dirty="0" err="1">
+                <a:latin typeface="Arial" panose="020B0604020202020204" pitchFamily="34" charset="0"/>
+                <a:cs typeface="Arial" panose="020B0604020202020204" pitchFamily="34" charset="0"/>
+              </a:rPr>
+              <a:t>Asymmetrique</a:t>
+            </a:r>
+            <a:r>
+              <a:rPr lang="en-US" sz="1200" dirty="0">
+                <a:latin typeface="Arial" panose="020B0604020202020204" pitchFamily="34" charset="0"/>
+                <a:cs typeface="Arial" panose="020B0604020202020204" pitchFamily="34" charset="0"/>
+              </a:rPr>
+              <a:t> Activity Score</a:t>
+            </a:r>
+          </a:p>
+          <a:p>
+            <a:pPr lvl="1">
+              <a:buFont typeface="Wingdings" panose="05000000000000000000" pitchFamily="2" charset="2"/>
+              <a:buChar char="Ø"/>
+            </a:pPr>
+            <a:r>
+              <a:rPr lang="en-US" sz="1200" dirty="0" err="1">
+                <a:latin typeface="Arial" panose="020B0604020202020204" pitchFamily="34" charset="0"/>
+                <a:cs typeface="Arial" panose="020B0604020202020204" pitchFamily="34" charset="0"/>
+              </a:rPr>
+              <a:t>Asymmetrique</a:t>
+            </a:r>
+            <a:r>
+              <a:rPr lang="en-US" sz="1200" dirty="0">
+                <a:latin typeface="Arial" panose="020B0604020202020204" pitchFamily="34" charset="0"/>
+                <a:cs typeface="Arial" panose="020B0604020202020204" pitchFamily="34" charset="0"/>
+              </a:rPr>
+              <a:t> Profile Score</a:t>
+            </a:r>
+          </a:p>
+          <a:p>
+            <a:pPr lvl="1">
+              <a:buFont typeface="Wingdings" panose="05000000000000000000" pitchFamily="2" charset="2"/>
+              <a:buChar char="Ø"/>
+            </a:pPr>
+            <a:r>
+              <a:rPr lang="en-US" sz="1200" dirty="0">
+                <a:latin typeface="Arial" panose="020B0604020202020204" pitchFamily="34" charset="0"/>
+                <a:cs typeface="Arial" panose="020B0604020202020204" pitchFamily="34" charset="0"/>
+              </a:rPr>
+              <a:t>Lead Quality</a:t>
+            </a:r>
+          </a:p>
+          <a:p>
+            <a:pPr>
+              <a:buFont typeface="Wingdings" panose="05000000000000000000" pitchFamily="2" charset="2"/>
+              <a:buChar char="Ø"/>
+            </a:pPr>
+            <a:r>
+              <a:rPr lang="en-US" sz="1200" dirty="0">
+                <a:latin typeface="Arial" panose="020B0604020202020204" pitchFamily="34" charset="0"/>
+                <a:cs typeface="Arial" panose="020B0604020202020204" pitchFamily="34" charset="0"/>
+              </a:rPr>
+              <a:t>14 columns which are having unique values and highly imbalanced columns has been removed</a:t>
+            </a:r>
+          </a:p>
+          <a:p>
+            <a:pPr lvl="1">
+              <a:buFont typeface="Wingdings" panose="05000000000000000000" pitchFamily="2" charset="2"/>
+              <a:buChar char="Ø"/>
+            </a:pPr>
+            <a:r>
+              <a:rPr lang="en-US" sz="1200" dirty="0">
+                <a:latin typeface="Arial" panose="020B0604020202020204" pitchFamily="34" charset="0"/>
+                <a:cs typeface="Arial" panose="020B0604020202020204" pitchFamily="34" charset="0"/>
+              </a:rPr>
               <a:t>Prospect ID, Lead Number, Magazine, Receive More Updates About Our Courses, Update me on Supply Chain Content, Get updates on DM Content, I agree to pay the amount through cheque, Do Not Call, Search, Newspaper Article, X Education Forums, Newspaper, Digital Advertisement, Through Recommendations</a:t>
             </a:r>
           </a:p>
           <a:p>
-            <a:r>
-              <a:rPr lang="en-US" sz="1600" dirty="0"/>
+            <a:pPr>
+              <a:buFont typeface="Wingdings" panose="05000000000000000000" pitchFamily="2" charset="2"/>
+              <a:buChar char="Ø"/>
+            </a:pPr>
+            <a:r>
+              <a:rPr lang="en-US" sz="1200" dirty="0">
+                <a:latin typeface="Arial" panose="020B0604020202020204" pitchFamily="34" charset="0"/>
+                <a:cs typeface="Arial" panose="020B0604020202020204" pitchFamily="34" charset="0"/>
+              </a:rPr>
               <a:t>On few columns the missing values are filled with median or mode accordingly based on datatype of the columns.</a:t>
             </a:r>
           </a:p>
@@ -6397,39 +6458,75 @@
           </a:bodyPr>
           <a:lstStyle/>
           <a:p>
-            <a:r>
-              <a:rPr lang="en-US" sz="1600" dirty="0"/>
+            <a:pPr>
+              <a:buFont typeface="Wingdings" panose="05000000000000000000" pitchFamily="2" charset="2"/>
+              <a:buChar char="Ø"/>
+            </a:pPr>
+            <a:r>
+              <a:rPr lang="en-US" sz="1200" dirty="0">
+                <a:latin typeface="Arial" panose="020B0604020202020204" pitchFamily="34" charset="0"/>
+                <a:cs typeface="Arial" panose="020B0604020202020204" pitchFamily="34" charset="0"/>
+              </a:rPr>
               <a:t>The “Select” value is treated as same as </a:t>
             </a:r>
             <a:r>
-              <a:rPr lang="en-US" sz="1600" dirty="0" err="1"/>
+              <a:rPr lang="en-US" sz="1200" dirty="0" err="1">
+                <a:latin typeface="Arial" panose="020B0604020202020204" pitchFamily="34" charset="0"/>
+                <a:cs typeface="Arial" panose="020B0604020202020204" pitchFamily="34" charset="0"/>
+              </a:rPr>
               <a:t>NaN</a:t>
             </a:r>
             <a:r>
-              <a:rPr lang="en-US" sz="1600" dirty="0"/>
+              <a:rPr lang="en-US" sz="1200" dirty="0">
+                <a:latin typeface="Arial" panose="020B0604020202020204" pitchFamily="34" charset="0"/>
+                <a:cs typeface="Arial" panose="020B0604020202020204" pitchFamily="34" charset="0"/>
+              </a:rPr>
               <a:t>. The columns which are having these values are </a:t>
             </a:r>
             <a:r>
-              <a:rPr lang="en-US" altLang="en-US" sz="1600" dirty="0"/>
+              <a:rPr lang="en-US" altLang="en-US" sz="1200" dirty="0">
+                <a:latin typeface="Arial" panose="020B0604020202020204" pitchFamily="34" charset="0"/>
+                <a:cs typeface="Arial" panose="020B0604020202020204" pitchFamily="34" charset="0"/>
+              </a:rPr>
               <a:t>'Specialization', 'How did you hear about X Education', 'Lead Profile', 'City’ </a:t>
             </a:r>
           </a:p>
           <a:p>
-            <a:r>
-              <a:rPr lang="en-US" sz="1600" dirty="0"/>
+            <a:pPr>
+              <a:buFont typeface="Wingdings" panose="05000000000000000000" pitchFamily="2" charset="2"/>
+              <a:buChar char="Ø"/>
+            </a:pPr>
+            <a:r>
+              <a:rPr lang="en-US" sz="1200" dirty="0">
+                <a:latin typeface="Arial" panose="020B0604020202020204" pitchFamily="34" charset="0"/>
+                <a:cs typeface="Arial" panose="020B0604020202020204" pitchFamily="34" charset="0"/>
+              </a:rPr>
               <a:t>Once the columns are updated, we further performed data missing/imputation treatment to the data</a:t>
             </a:r>
           </a:p>
           <a:p>
-            <a:r>
-              <a:rPr lang="en-US" sz="1600" dirty="0"/>
+            <a:pPr>
+              <a:buFont typeface="Wingdings" panose="05000000000000000000" pitchFamily="2" charset="2"/>
+              <a:buChar char="Ø"/>
+            </a:pPr>
+            <a:r>
+              <a:rPr lang="en-US" sz="1200" dirty="0">
+                <a:latin typeface="Arial" panose="020B0604020202020204" pitchFamily="34" charset="0"/>
+                <a:cs typeface="Arial" panose="020B0604020202020204" pitchFamily="34" charset="0"/>
+              </a:rPr>
               <a:t>2 columns - </a:t>
             </a:r>
             <a:r>
-              <a:rPr lang="en-US" altLang="en-US" sz="1600" dirty="0"/>
+              <a:rPr lang="en-US" altLang="en-US" sz="1200" dirty="0">
+                <a:latin typeface="Arial" panose="020B0604020202020204" pitchFamily="34" charset="0"/>
+                <a:cs typeface="Arial" panose="020B0604020202020204" pitchFamily="34" charset="0"/>
+              </a:rPr>
               <a:t>'How did you hear about X Education', 'Lead Profile’,  are having more than 40% data are deleted</a:t>
             </a:r>
-            <a:endParaRPr lang="en-US" sz="1600" dirty="0"/>
+            <a:endParaRPr lang="en-US" sz="1200" dirty="0">
+              <a:latin typeface="Arial" panose="020B0604020202020204" pitchFamily="34" charset="0"/>
+              <a:cs typeface="Arial" panose="020B0604020202020204" pitchFamily="34" charset="0"/>
+            </a:endParaRPr>
           </a:p>
         </p:txBody>
       </p:sp>
@@ -6642,24 +6739,45 @@
         </p:spPr>
         <p:txBody>
           <a:bodyPr>
-            <a:normAutofit fontScale="92500" lnSpcReduction="20000"/>
+            <a:normAutofit/>
           </a:bodyPr>
           <a:lstStyle/>
           <a:p>
-            <a:r>
-              <a:rPr lang="en-US" sz="1600" dirty="0"/>
+            <a:pPr>
+              <a:buFont typeface="Wingdings" panose="05000000000000000000" pitchFamily="2" charset="2"/>
+              <a:buChar char="Ø"/>
+            </a:pPr>
+            <a:r>
+              <a:rPr lang="en-US" sz="1200" dirty="0">
+                <a:latin typeface="Arial" panose="020B0604020202020204" pitchFamily="34" charset="0"/>
+                <a:cs typeface="Arial" panose="020B0604020202020204" pitchFamily="34" charset="0"/>
+              </a:rPr>
               <a:t>Most leads are from API and Landing Page Submission</a:t>
             </a:r>
           </a:p>
           <a:p>
-            <a:r>
-              <a:rPr lang="en-US" sz="1600" dirty="0"/>
+            <a:pPr>
+              <a:buFont typeface="Wingdings" panose="05000000000000000000" pitchFamily="2" charset="2"/>
+              <a:buChar char="Ø"/>
+            </a:pPr>
+            <a:r>
+              <a:rPr lang="en-US" sz="1200" dirty="0">
+                <a:latin typeface="Arial" panose="020B0604020202020204" pitchFamily="34" charset="0"/>
+                <a:cs typeface="Arial" panose="020B0604020202020204" pitchFamily="34" charset="0"/>
+              </a:rPr>
               <a:t>Most converted leads are from "Lead Add Form".</a:t>
             </a:r>
           </a:p>
           <a:p>
-            <a:r>
-              <a:rPr lang="en-US" sz="1600" dirty="0"/>
+            <a:pPr>
+              <a:buFont typeface="Wingdings" panose="05000000000000000000" pitchFamily="2" charset="2"/>
+              <a:buChar char="Ø"/>
+            </a:pPr>
+            <a:r>
+              <a:rPr lang="en-US" sz="1200" dirty="0">
+                <a:latin typeface="Arial" panose="020B0604020202020204" pitchFamily="34" charset="0"/>
+                <a:cs typeface="Arial" panose="020B0604020202020204" pitchFamily="34" charset="0"/>
+              </a:rPr>
               <a:t>There are negligible leads from “Lead Import” and “Quick Add Form”</a:t>
             </a:r>
           </a:p>
@@ -6816,14 +6934,28 @@
           </a:bodyPr>
           <a:lstStyle/>
           <a:p>
-            <a:r>
-              <a:rPr lang="en-US" sz="1600" dirty="0"/>
+            <a:pPr>
+              <a:buFont typeface="Wingdings" panose="05000000000000000000" pitchFamily="2" charset="2"/>
+              <a:buChar char="Ø"/>
+            </a:pPr>
+            <a:r>
+              <a:rPr lang="en-US" sz="1200" dirty="0">
+                <a:latin typeface="Arial" panose="020B0604020202020204" pitchFamily="34" charset="0"/>
+                <a:cs typeface="Arial" panose="020B0604020202020204" pitchFamily="34" charset="0"/>
+              </a:rPr>
               <a:t>The major converted leads are from "Email Opened" and "SMS sent"</a:t>
             </a:r>
           </a:p>
           <a:p>
-            <a:r>
-              <a:rPr lang="en-US" sz="1600" dirty="0"/>
+            <a:pPr>
+              <a:buFont typeface="Wingdings" panose="05000000000000000000" pitchFamily="2" charset="2"/>
+              <a:buChar char="Ø"/>
+            </a:pPr>
+            <a:r>
+              <a:rPr lang="en-US" sz="1200" dirty="0">
+                <a:latin typeface="Arial" panose="020B0604020202020204" pitchFamily="34" charset="0"/>
+                <a:cs typeface="Arial" panose="020B0604020202020204" pitchFamily="34" charset="0"/>
+              </a:rPr>
               <a:t>These options can be used efficiently for better converted ratio</a:t>
             </a:r>
           </a:p>
@@ -6979,14 +7111,28 @@
           </a:bodyPr>
           <a:lstStyle/>
           <a:p>
-            <a:r>
-              <a:rPr lang="en-US" sz="1600" dirty="0"/>
+            <a:pPr>
+              <a:buFont typeface="Wingdings" panose="05000000000000000000" pitchFamily="2" charset="2"/>
+              <a:buChar char="Ø"/>
+            </a:pPr>
+            <a:r>
+              <a:rPr lang="en-US" sz="1200" dirty="0">
+                <a:latin typeface="Arial" panose="020B0604020202020204" pitchFamily="34" charset="0"/>
+                <a:cs typeface="Arial" panose="020B0604020202020204" pitchFamily="34" charset="0"/>
+              </a:rPr>
               <a:t>Maximum number of the leads are spent less than 45 mins i.e. ~2650 customers</a:t>
             </a:r>
           </a:p>
           <a:p>
-            <a:r>
-              <a:rPr lang="en-US" sz="1600" dirty="0"/>
+            <a:pPr>
+              <a:buFont typeface="Wingdings" panose="05000000000000000000" pitchFamily="2" charset="2"/>
+              <a:buChar char="Ø"/>
+            </a:pPr>
+            <a:r>
+              <a:rPr lang="en-US" sz="1200" dirty="0">
+                <a:latin typeface="Arial" panose="020B0604020202020204" pitchFamily="34" charset="0"/>
+                <a:cs typeface="Arial" panose="020B0604020202020204" pitchFamily="34" charset="0"/>
+              </a:rPr>
               <a:t>&gt;2000 customers spent between 45 mins and 272 mins</a:t>
             </a:r>
           </a:p>
@@ -7142,28 +7288,53 @@
           </a:bodyPr>
           <a:lstStyle/>
           <a:p>
-            <a:r>
-              <a:rPr lang="en-US" sz="1600" dirty="0"/>
+            <a:pPr>
+              <a:buFont typeface="Wingdings" panose="05000000000000000000" pitchFamily="2" charset="2"/>
+              <a:buChar char="Ø"/>
+            </a:pPr>
+            <a:r>
+              <a:rPr lang="en-US" sz="1600" dirty="0">
+                <a:latin typeface="Arial" panose="020B0604020202020204" pitchFamily="34" charset="0"/>
+                <a:cs typeface="Arial" panose="020B0604020202020204" pitchFamily="34" charset="0"/>
+              </a:rPr>
               <a:t>Most of the leads and converted leads are from Modified, Email Opened and SMS sent.</a:t>
             </a:r>
           </a:p>
           <a:p>
-            <a:r>
-              <a:rPr lang="en-US" sz="1600" dirty="0"/>
+            <a:pPr>
+              <a:buFont typeface="Wingdings" panose="05000000000000000000" pitchFamily="2" charset="2"/>
+              <a:buChar char="Ø"/>
+            </a:pPr>
+            <a:r>
+              <a:rPr lang="en-US" sz="1600" dirty="0">
+                <a:latin typeface="Arial" panose="020B0604020202020204" pitchFamily="34" charset="0"/>
+                <a:cs typeface="Arial" panose="020B0604020202020204" pitchFamily="34" charset="0"/>
+              </a:rPr>
               <a:t>High rate of converted leads are via SMS sent</a:t>
             </a:r>
           </a:p>
           <a:p>
-            <a:r>
-              <a:rPr lang="en-US" sz="1600" dirty="0"/>
+            <a:pPr>
+              <a:buFont typeface="Wingdings" panose="05000000000000000000" pitchFamily="2" charset="2"/>
+              <a:buChar char="Ø"/>
+            </a:pPr>
+            <a:r>
+              <a:rPr lang="en-US" sz="1600" dirty="0">
+                <a:latin typeface="Arial" panose="020B0604020202020204" pitchFamily="34" charset="0"/>
+                <a:cs typeface="Arial" panose="020B0604020202020204" pitchFamily="34" charset="0"/>
+              </a:rPr>
               <a:t>There are no/negligible leads from Approached upfront, Resubscribed to emails, View in browser link, Form submitted on website, Email received and Email marked as spam</a:t>
             </a:r>
           </a:p>
           <a:p>
-            <a:pPr marL="0" indent="0">
-              <a:buNone/>
-            </a:pPr>
-            <a:endParaRPr lang="en-US" sz="1600" dirty="0"/>
+            <a:pPr>
+              <a:buFont typeface="Wingdings" panose="05000000000000000000" pitchFamily="2" charset="2"/>
+              <a:buChar char="Ø"/>
+            </a:pPr>
+            <a:endParaRPr lang="en-US" sz="1600" dirty="0">
+              <a:latin typeface="Arial" panose="020B0604020202020204" pitchFamily="34" charset="0"/>
+              <a:cs typeface="Arial" panose="020B0604020202020204" pitchFamily="34" charset="0"/>
+            </a:endParaRPr>
           </a:p>
         </p:txBody>
       </p:sp>
@@ -7489,6 +7660,15 @@
 </file>
 
 <file path=customXml/item1.xml><?xml version="1.0" encoding="utf-8"?>
+<?mso-contentType ?>
+<FormTemplates xmlns="http://schemas.microsoft.com/sharepoint/v3/contenttype/forms">
+  <Display>DocumentLibraryForm</Display>
+  <Edit>DocumentLibraryForm</Edit>
+  <New>DocumentLibraryForm</New>
+</FormTemplates>
+</file>
+
+<file path=customXml/item2.xml><?xml version="1.0" encoding="utf-8"?>
 <ct:contentTypeSchema xmlns:ct="http://schemas.microsoft.com/office/2006/metadata/contentType" xmlns:ma="http://schemas.microsoft.com/office/2006/metadata/properties/metaAttributes" ct:_="" ma:_="" ma:contentTypeName="Document" ma:contentTypeID="0x01010079F111ED35F8CC479449609E8A0923A6" ma:contentTypeVersion="27" ma:contentTypeDescription="Create a new document." ma:contentTypeScope="" ma:versionID="c6f9a84f66a9c8b9a21755b9ffafb945">
   <xsd:schema xmlns:xsd="http://www.w3.org/2001/XMLSchema" xmlns:xs="http://www.w3.org/2001/XMLSchema" xmlns:p="http://schemas.microsoft.com/office/2006/metadata/properties" xmlns:ns1="http://schemas.microsoft.com/sharepoint/v3" xmlns:ns2="71af3243-3dd4-4a8d-8c0d-dd76da1f02a5" xmlns:ns3="16c05727-aa75-4e4a-9b5f-8a80a1165891" xmlns:ns4="230e9df3-be65-4c73-a93b-d1236ebd677e" targetNamespace="http://schemas.microsoft.com/office/2006/metadata/properties" ma:root="true" ma:fieldsID="27df39e3e7036dff54f89ddd5805ce72" ns1:_="" ns2:_="" ns3:_="" ns4:_="">
     <xsd:import namespace="http://schemas.microsoft.com/sharepoint/v3"/>
@@ -7794,15 +7974,6 @@
 </ct:contentTypeSchema>
 </file>
 
-<file path=customXml/item2.xml><?xml version="1.0" encoding="utf-8"?>
-<?mso-contentType ?>
-<FormTemplates xmlns="http://schemas.microsoft.com/sharepoint/v3/contenttype/forms">
-  <Display>DocumentLibraryForm</Display>
-  <Edit>DocumentLibraryForm</Edit>
-  <New>DocumentLibraryForm</New>
-</FormTemplates>
-</file>
-
 <file path=customXml/item3.xml><?xml version="1.0" encoding="utf-8"?>
 <p:properties xmlns:p="http://schemas.microsoft.com/office/2006/metadata/properties" xmlns:xsi="http://www.w3.org/2001/XMLSchema-instance" xmlns:pc="http://schemas.microsoft.com/office/infopath/2007/PartnerControls">
   <documentManagement>
@@ -7824,6 +7995,14 @@
 </file>
 
 <file path=customXml/itemProps1.xml><?xml version="1.0" encoding="utf-8"?>
+<ds:datastoreItem xmlns:ds="http://schemas.openxmlformats.org/officeDocument/2006/customXml" ds:itemID="{19DAD249-BF80-48EF-9AFB-36A11BCDC2CE}">
+  <ds:schemaRefs>
+    <ds:schemaRef ds:uri="http://schemas.microsoft.com/sharepoint/v3/contenttype/forms"/>
+  </ds:schemaRefs>
+</ds:datastoreItem>
+</file>
+
+<file path=customXml/itemProps2.xml><?xml version="1.0" encoding="utf-8"?>
 <ds:datastoreItem xmlns:ds="http://schemas.openxmlformats.org/officeDocument/2006/customXml" ds:itemID="{C5A59D56-2157-4202-9D02-F44E447A241D}">
   <ds:schemaRefs>
     <ds:schemaRef ds:uri="http://schemas.microsoft.com/office/2006/metadata/contentType"/>
@@ -7844,14 +8023,6 @@
 </ds:datastoreItem>
 </file>
 
-<file path=customXml/itemProps2.xml><?xml version="1.0" encoding="utf-8"?>
-<ds:datastoreItem xmlns:ds="http://schemas.openxmlformats.org/officeDocument/2006/customXml" ds:itemID="{19DAD249-BF80-48EF-9AFB-36A11BCDC2CE}">
-  <ds:schemaRefs>
-    <ds:schemaRef ds:uri="http://schemas.microsoft.com/sharepoint/v3/contenttype/forms"/>
-  </ds:schemaRefs>
-</ds:datastoreItem>
-</file>
-
 <file path=customXml/itemProps3.xml><?xml version="1.0" encoding="utf-8"?>
 <ds:datastoreItem xmlns:ds="http://schemas.openxmlformats.org/officeDocument/2006/customXml" ds:itemID="{6F4F4D41-822D-40F2-A7AC-E4E6CB36CA7A}">
   <ds:schemaRefs>

</xml_diff>